<commit_message>
Comitting recent Changes (Dels, Notebook, etc)
</commit_message>
<xml_diff>
--- a/Presentation (MICROSOFT STUDIO).pptx
+++ b/Presentation (MICROSOFT STUDIO).pptx
@@ -5,7 +5,7 @@
     <p:sldMasterId id="2147483650" r:id="rId4"/>
   </p:sldMasterIdLst>
   <p:notesMasterIdLst>
-    <p:notesMasterId r:id="rId16"/>
+    <p:notesMasterId r:id="rId21"/>
   </p:notesMasterIdLst>
   <p:sldIdLst>
     <p:sldId id="278" r:id="rId5"/>
@@ -16,9 +16,14 @@
     <p:sldId id="295" r:id="rId10"/>
     <p:sldId id="284" r:id="rId11"/>
     <p:sldId id="294" r:id="rId12"/>
-    <p:sldId id="290" r:id="rId13"/>
-    <p:sldId id="292" r:id="rId14"/>
-    <p:sldId id="293" r:id="rId15"/>
+    <p:sldId id="299" r:id="rId13"/>
+    <p:sldId id="296" r:id="rId14"/>
+    <p:sldId id="297" r:id="rId15"/>
+    <p:sldId id="298" r:id="rId16"/>
+    <p:sldId id="300" r:id="rId17"/>
+    <p:sldId id="290" r:id="rId18"/>
+    <p:sldId id="292" r:id="rId19"/>
+    <p:sldId id="293" r:id="rId20"/>
   </p:sldIdLst>
   <p:sldSz cx="12192000" cy="6858000"/>
   <p:notesSz cx="13716000" cy="24384000"/>
@@ -23149,6 +23154,36 @@
           <a:chExt cx="0" cy="0"/>
         </a:xfrm>
       </p:grpSpPr>
+      <p:pic>
+        <p:nvPicPr>
+          <p:cNvPr id="7" name="Picture 6">
+            <a:extLst>
+              <a:ext uri="{FF2B5EF4-FFF2-40B4-BE49-F238E27FC236}">
+                <a16:creationId xmlns:a16="http://schemas.microsoft.com/office/drawing/2014/main" id="{D8346EBB-6FD7-0386-B3E3-143D7C660065}"/>
+              </a:ext>
+            </a:extLst>
+          </p:cNvPr>
+          <p:cNvPicPr>
+            <a:picLocks noChangeAspect="1"/>
+          </p:cNvPicPr>
+          <p:nvPr/>
+        </p:nvPicPr>
+        <p:blipFill>
+          <a:blip r:embed="rId2"/>
+          <a:stretch>
+            <a:fillRect/>
+          </a:stretch>
+        </p:blipFill>
+        <p:spPr>
+          <a:xfrm>
+            <a:off x="2914911" y="348458"/>
+            <a:ext cx="5873997" cy="3671248"/>
+          </a:xfrm>
+          <a:prstGeom prst="rect">
+            <a:avLst/>
+          </a:prstGeom>
+        </p:spPr>
+      </p:pic>
       <p:sp>
         <p:nvSpPr>
           <p:cNvPr id="2" name="Title 1">
@@ -23165,20 +23200,21 @@
             <p:ph type="ctrTitle"/>
           </p:nvPr>
         </p:nvSpPr>
-        <p:spPr/>
+        <p:spPr>
+          <a:xfrm>
+            <a:off x="3771582" y="2403201"/>
+            <a:ext cx="5385816" cy="1329901"/>
+          </a:xfrm>
+        </p:spPr>
         <p:txBody>
           <a:bodyPr/>
           <a:lstStyle/>
           <a:p>
-            <a:r>
-              <a:rPr lang="en-US" dirty="0"/>
-              <a:t>MICROSOFT</a:t>
-            </a:r>
             <a:br>
-              <a:rPr lang="en-US" dirty="0"/>
+              <a:rPr lang="en-US" sz="6600" dirty="0"/>
             </a:br>
             <a:r>
-              <a:rPr lang="en-US" dirty="0"/>
+              <a:rPr lang="en-US" sz="6600" dirty="0"/>
               <a:t>STUDIO</a:t>
             </a:r>
           </a:p>
@@ -23200,7 +23236,12 @@
             <p:ph type="subTitle" idx="1"/>
           </p:nvPr>
         </p:nvSpPr>
-        <p:spPr/>
+        <p:spPr>
+          <a:xfrm>
+            <a:off x="4349496" y="4002052"/>
+            <a:ext cx="3493008" cy="17654"/>
+          </a:xfrm>
+        </p:spPr>
         <p:txBody>
           <a:bodyPr/>
           <a:lstStyle/>
@@ -23226,6 +23267,2021 @@
 </file>
 
 <file path=ppt/slides/slide10.xml><?xml version="1.0" encoding="utf-8"?>
+<p:sld xmlns:a="http://schemas.openxmlformats.org/drawingml/2006/main" xmlns:r="http://schemas.openxmlformats.org/officeDocument/2006/relationships" xmlns:p="http://schemas.openxmlformats.org/presentationml/2006/main">
+  <p:cSld>
+    <p:spTree>
+      <p:nvGrpSpPr>
+        <p:cNvPr id="1" name=""/>
+        <p:cNvGrpSpPr/>
+        <p:nvPr/>
+      </p:nvGrpSpPr>
+      <p:grpSpPr>
+        <a:xfrm>
+          <a:off x="0" y="0"/>
+          <a:ext cx="0" cy="0"/>
+          <a:chOff x="0" y="0"/>
+          <a:chExt cx="0" cy="0"/>
+        </a:xfrm>
+      </p:grpSpPr>
+      <p:pic>
+        <p:nvPicPr>
+          <p:cNvPr id="7" name="Picture 6">
+            <a:extLst>
+              <a:ext uri="{FF2B5EF4-FFF2-40B4-BE49-F238E27FC236}">
+                <a16:creationId xmlns:a16="http://schemas.microsoft.com/office/drawing/2014/main" id="{4B9C7F76-C775-BB87-1B28-A119985A7672}"/>
+              </a:ext>
+            </a:extLst>
+          </p:cNvPr>
+          <p:cNvPicPr>
+            <a:picLocks noChangeAspect="1"/>
+          </p:cNvPicPr>
+          <p:nvPr/>
+        </p:nvPicPr>
+        <p:blipFill>
+          <a:blip r:embed="rId2"/>
+          <a:stretch>
+            <a:fillRect/>
+          </a:stretch>
+        </p:blipFill>
+        <p:spPr>
+          <a:xfrm>
+            <a:off x="5777461" y="723921"/>
+            <a:ext cx="6208742" cy="3828571"/>
+          </a:xfrm>
+          <a:prstGeom prst="rect">
+            <a:avLst/>
+          </a:prstGeom>
+        </p:spPr>
+      </p:pic>
+      <p:pic>
+        <p:nvPicPr>
+          <p:cNvPr id="10" name="Picture 9">
+            <a:extLst>
+              <a:ext uri="{FF2B5EF4-FFF2-40B4-BE49-F238E27FC236}">
+                <a16:creationId xmlns:a16="http://schemas.microsoft.com/office/drawing/2014/main" id="{FD2BE1C6-91C3-0B00-7248-D5B8A762714B}"/>
+              </a:ext>
+            </a:extLst>
+          </p:cNvPr>
+          <p:cNvPicPr>
+            <a:picLocks noChangeAspect="1"/>
+          </p:cNvPicPr>
+          <p:nvPr/>
+        </p:nvPicPr>
+        <p:blipFill>
+          <a:blip r:embed="rId3"/>
+          <a:stretch>
+            <a:fillRect/>
+          </a:stretch>
+        </p:blipFill>
+        <p:spPr>
+          <a:xfrm>
+            <a:off x="416298" y="2305508"/>
+            <a:ext cx="5666667" cy="3828571"/>
+          </a:xfrm>
+          <a:prstGeom prst="rect">
+            <a:avLst/>
+          </a:prstGeom>
+        </p:spPr>
+      </p:pic>
+      <p:sp>
+        <p:nvSpPr>
+          <p:cNvPr id="2" name="Title 1">
+            <a:extLst>
+              <a:ext uri="{FF2B5EF4-FFF2-40B4-BE49-F238E27FC236}">
+                <a16:creationId xmlns:a16="http://schemas.microsoft.com/office/drawing/2014/main" id="{E8583CC6-B57A-4553-C481-80F3AB2BFA86}"/>
+              </a:ext>
+            </a:extLst>
+          </p:cNvPr>
+          <p:cNvSpPr>
+            <a:spLocks noGrp="1"/>
+          </p:cNvSpPr>
+          <p:nvPr>
+            <p:ph type="title"/>
+          </p:nvPr>
+        </p:nvSpPr>
+        <p:spPr>
+          <a:xfrm>
+            <a:off x="-245659" y="457200"/>
+            <a:ext cx="7519916" cy="768096"/>
+          </a:xfrm>
+        </p:spPr>
+        <p:txBody>
+          <a:bodyPr/>
+          <a:lstStyle/>
+          <a:p>
+            <a:r>
+              <a:rPr lang="en-US" dirty="0">
+                <a:solidFill>
+                  <a:schemeClr val="accent1">
+                    <a:lumMod val="50000"/>
+                  </a:schemeClr>
+                </a:solidFill>
+              </a:rPr>
+              <a:t>Film and TimeLine</a:t>
+            </a:r>
+          </a:p>
+        </p:txBody>
+      </p:sp>
+      <p:sp>
+        <p:nvSpPr>
+          <p:cNvPr id="3" name="Content Placeholder 2">
+            <a:extLst>
+              <a:ext uri="{FF2B5EF4-FFF2-40B4-BE49-F238E27FC236}">
+                <a16:creationId xmlns:a16="http://schemas.microsoft.com/office/drawing/2014/main" id="{08F94E80-9F35-E8A7-32FB-0EA0A627C551}"/>
+              </a:ext>
+            </a:extLst>
+          </p:cNvPr>
+          <p:cNvSpPr>
+            <a:spLocks noGrp="1"/>
+          </p:cNvSpPr>
+          <p:nvPr>
+            <p:ph sz="half" idx="1"/>
+          </p:nvPr>
+        </p:nvSpPr>
+        <p:spPr>
+          <a:xfrm>
+            <a:off x="752103" y="1425508"/>
+            <a:ext cx="4689553" cy="1135767"/>
+          </a:xfrm>
+        </p:spPr>
+        <p:txBody>
+          <a:bodyPr/>
+          <a:lstStyle/>
+          <a:p>
+            <a:r>
+              <a:rPr lang="en-US" dirty="0"/>
+              <a:t>The number of Films produced has fallen drastically. Pointing out there is a huge opening in the Film industry. See </a:t>
+            </a:r>
+            <a:r>
+              <a:rPr lang="en-US" dirty="0">
+                <a:solidFill>
+                  <a:schemeClr val="tx1"/>
+                </a:solidFill>
+              </a:rPr>
+              <a:t>Figure 2</a:t>
+            </a:r>
+          </a:p>
+        </p:txBody>
+      </p:sp>
+      <p:sp>
+        <p:nvSpPr>
+          <p:cNvPr id="5" name="Slide Number Placeholder 4">
+            <a:extLst>
+              <a:ext uri="{FF2B5EF4-FFF2-40B4-BE49-F238E27FC236}">
+                <a16:creationId xmlns:a16="http://schemas.microsoft.com/office/drawing/2014/main" id="{379E0893-3FBE-E89C-6049-2501164671BA}"/>
+              </a:ext>
+            </a:extLst>
+          </p:cNvPr>
+          <p:cNvSpPr>
+            <a:spLocks noGrp="1"/>
+          </p:cNvSpPr>
+          <p:nvPr>
+            <p:ph type="sldNum" sz="quarter" idx="12"/>
+          </p:nvPr>
+        </p:nvSpPr>
+        <p:spPr/>
+        <p:txBody>
+          <a:bodyPr/>
+          <a:lstStyle/>
+          <a:p>
+            <a:fld id="{48F63A3B-78C7-47BE-AE5E-E10140E04643}" type="slidenum">
+              <a:rPr lang="en-US" smtClean="0"/>
+              <a:t>10</a:t>
+            </a:fld>
+            <a:endParaRPr lang="en-US" dirty="0"/>
+          </a:p>
+        </p:txBody>
+      </p:sp>
+      <p:sp>
+        <p:nvSpPr>
+          <p:cNvPr id="8" name="TextBox 7">
+            <a:extLst>
+              <a:ext uri="{FF2B5EF4-FFF2-40B4-BE49-F238E27FC236}">
+                <a16:creationId xmlns:a16="http://schemas.microsoft.com/office/drawing/2014/main" id="{A0822314-8EF4-FB1F-2F0D-EF8B650EF5D1}"/>
+              </a:ext>
+            </a:extLst>
+          </p:cNvPr>
+          <p:cNvSpPr txBox="1"/>
+          <p:nvPr/>
+        </p:nvSpPr>
+        <p:spPr>
+          <a:xfrm>
+            <a:off x="10324395" y="3934683"/>
+            <a:ext cx="1241946" cy="369332"/>
+          </a:xfrm>
+          <a:prstGeom prst="rect">
+            <a:avLst/>
+          </a:prstGeom>
+          <a:noFill/>
+        </p:spPr>
+        <p:txBody>
+          <a:bodyPr wrap="square" rtlCol="0">
+            <a:spAutoFit/>
+          </a:bodyPr>
+          <a:lstStyle/>
+          <a:p>
+            <a:r>
+              <a:rPr lang="en-US" b="1" dirty="0"/>
+              <a:t>Figure 2</a:t>
+            </a:r>
+          </a:p>
+        </p:txBody>
+      </p:sp>
+      <p:sp>
+        <p:nvSpPr>
+          <p:cNvPr id="11" name="TextBox 10">
+            <a:extLst>
+              <a:ext uri="{FF2B5EF4-FFF2-40B4-BE49-F238E27FC236}">
+                <a16:creationId xmlns:a16="http://schemas.microsoft.com/office/drawing/2014/main" id="{32F96276-C3C1-171B-A4B5-BFE87E19D4FC}"/>
+              </a:ext>
+            </a:extLst>
+          </p:cNvPr>
+          <p:cNvSpPr txBox="1"/>
+          <p:nvPr/>
+        </p:nvSpPr>
+        <p:spPr>
+          <a:xfrm>
+            <a:off x="816566" y="6044105"/>
+            <a:ext cx="1241946" cy="369332"/>
+          </a:xfrm>
+          <a:prstGeom prst="rect">
+            <a:avLst/>
+          </a:prstGeom>
+          <a:noFill/>
+        </p:spPr>
+        <p:txBody>
+          <a:bodyPr wrap="square" rtlCol="0">
+            <a:spAutoFit/>
+          </a:bodyPr>
+          <a:lstStyle/>
+          <a:p>
+            <a:r>
+              <a:rPr lang="en-US" b="1" dirty="0"/>
+              <a:t>Figure 3</a:t>
+            </a:r>
+          </a:p>
+        </p:txBody>
+      </p:sp>
+      <p:sp>
+        <p:nvSpPr>
+          <p:cNvPr id="12" name="Content Placeholder 2">
+            <a:extLst>
+              <a:ext uri="{FF2B5EF4-FFF2-40B4-BE49-F238E27FC236}">
+                <a16:creationId xmlns:a16="http://schemas.microsoft.com/office/drawing/2014/main" id="{EF957F99-D3E0-E1D0-6820-31326F54EB8A}"/>
+              </a:ext>
+            </a:extLst>
+          </p:cNvPr>
+          <p:cNvSpPr txBox="1">
+            <a:spLocks/>
+          </p:cNvSpPr>
+          <p:nvPr/>
+        </p:nvSpPr>
+        <p:spPr>
+          <a:xfrm>
+            <a:off x="6570917" y="4588121"/>
+            <a:ext cx="4689553" cy="1135767"/>
+          </a:xfrm>
+          <a:prstGeom prst="rect">
+            <a:avLst/>
+          </a:prstGeom>
+        </p:spPr>
+        <p:txBody>
+          <a:bodyPr vert="horz" lIns="91440" tIns="45720" rIns="91440" bIns="45720" rtlCol="0">
+            <a:noAutofit/>
+          </a:bodyPr>
+          <a:lstStyle>
+            <a:lvl1pPr marL="347472" indent="-347472" algn="l" defTabSz="914400" rtl="0" eaLnBrk="1" latinLnBrk="0" hangingPunct="1">
+              <a:lnSpc>
+                <a:spcPct val="100000"/>
+              </a:lnSpc>
+              <a:spcBef>
+                <a:spcPts val="360"/>
+              </a:spcBef>
+              <a:buFont typeface="Arial" panose="020B0604020202020204" pitchFamily="34" charset="0"/>
+              <a:buChar char="•"/>
+              <a:defRPr sz="1800" kern="1200">
+                <a:solidFill>
+                  <a:schemeClr val="accent6"/>
+                </a:solidFill>
+                <a:latin typeface="+mn-lt"/>
+                <a:ea typeface="+mn-ea"/>
+                <a:cs typeface="+mn-cs"/>
+              </a:defRPr>
+            </a:lvl1pPr>
+            <a:lvl2pPr marL="685800" indent="-347472" algn="l" defTabSz="914400" rtl="0" eaLnBrk="1" latinLnBrk="0" hangingPunct="1">
+              <a:lnSpc>
+                <a:spcPct val="100000"/>
+              </a:lnSpc>
+              <a:spcBef>
+                <a:spcPts val="360"/>
+              </a:spcBef>
+              <a:buFont typeface="Arial" panose="020B0604020202020204" pitchFamily="34" charset="0"/>
+              <a:buChar char="•"/>
+              <a:defRPr sz="1600" kern="1200">
+                <a:solidFill>
+                  <a:schemeClr val="accent6"/>
+                </a:solidFill>
+                <a:latin typeface="+mn-lt"/>
+                <a:ea typeface="+mn-ea"/>
+                <a:cs typeface="+mn-cs"/>
+              </a:defRPr>
+            </a:lvl2pPr>
+            <a:lvl3pPr marL="1143000" indent="-347472" algn="l" defTabSz="914400" rtl="0" eaLnBrk="1" latinLnBrk="0" hangingPunct="1">
+              <a:lnSpc>
+                <a:spcPct val="100000"/>
+              </a:lnSpc>
+              <a:spcBef>
+                <a:spcPts val="360"/>
+              </a:spcBef>
+              <a:buFont typeface="Arial" panose="020B0604020202020204" pitchFamily="34" charset="0"/>
+              <a:buChar char="•"/>
+              <a:defRPr sz="1400" kern="1200">
+                <a:solidFill>
+                  <a:schemeClr val="accent6"/>
+                </a:solidFill>
+                <a:latin typeface="+mn-lt"/>
+                <a:ea typeface="+mn-ea"/>
+                <a:cs typeface="+mn-cs"/>
+              </a:defRPr>
+            </a:lvl3pPr>
+            <a:lvl4pPr marL="1600200" indent="-347472" algn="l" defTabSz="914400" rtl="0" eaLnBrk="1" latinLnBrk="0" hangingPunct="1">
+              <a:lnSpc>
+                <a:spcPct val="100000"/>
+              </a:lnSpc>
+              <a:spcBef>
+                <a:spcPts val="360"/>
+              </a:spcBef>
+              <a:buFont typeface="Arial" panose="020B0604020202020204" pitchFamily="34" charset="0"/>
+              <a:buChar char="•"/>
+              <a:defRPr sz="1200" kern="1200">
+                <a:solidFill>
+                  <a:schemeClr val="accent6"/>
+                </a:solidFill>
+                <a:latin typeface="+mn-lt"/>
+                <a:ea typeface="+mn-ea"/>
+                <a:cs typeface="+mn-cs"/>
+              </a:defRPr>
+            </a:lvl4pPr>
+            <a:lvl5pPr marL="2057400" indent="-347472" algn="l" defTabSz="914400" rtl="0" eaLnBrk="1" latinLnBrk="0" hangingPunct="1">
+              <a:lnSpc>
+                <a:spcPct val="100000"/>
+              </a:lnSpc>
+              <a:spcBef>
+                <a:spcPts val="360"/>
+              </a:spcBef>
+              <a:buFont typeface="Arial" panose="020B0604020202020204" pitchFamily="34" charset="0"/>
+              <a:buChar char="•"/>
+              <a:defRPr sz="1200" kern="1200">
+                <a:solidFill>
+                  <a:schemeClr val="accent6"/>
+                </a:solidFill>
+                <a:latin typeface="+mn-lt"/>
+                <a:ea typeface="+mn-ea"/>
+                <a:cs typeface="+mn-cs"/>
+              </a:defRPr>
+            </a:lvl5pPr>
+            <a:lvl6pPr marL="2514600" indent="-228600" algn="l" defTabSz="914400" rtl="0" eaLnBrk="1" latinLnBrk="0" hangingPunct="1">
+              <a:lnSpc>
+                <a:spcPct val="90000"/>
+              </a:lnSpc>
+              <a:spcBef>
+                <a:spcPts val="500"/>
+              </a:spcBef>
+              <a:buFont typeface="Arial" panose="020B0604020202020204" pitchFamily="34" charset="0"/>
+              <a:buChar char="•"/>
+              <a:defRPr sz="1800" kern="1200">
+                <a:solidFill>
+                  <a:schemeClr val="tx1"/>
+                </a:solidFill>
+                <a:latin typeface="+mn-lt"/>
+                <a:ea typeface="+mn-ea"/>
+                <a:cs typeface="+mn-cs"/>
+              </a:defRPr>
+            </a:lvl6pPr>
+            <a:lvl7pPr marL="2971800" indent="-228600" algn="l" defTabSz="914400" rtl="0" eaLnBrk="1" latinLnBrk="0" hangingPunct="1">
+              <a:lnSpc>
+                <a:spcPct val="90000"/>
+              </a:lnSpc>
+              <a:spcBef>
+                <a:spcPts val="500"/>
+              </a:spcBef>
+              <a:buFont typeface="Arial" panose="020B0604020202020204" pitchFamily="34" charset="0"/>
+              <a:buChar char="•"/>
+              <a:defRPr sz="1800" kern="1200">
+                <a:solidFill>
+                  <a:schemeClr val="tx1"/>
+                </a:solidFill>
+                <a:latin typeface="+mn-lt"/>
+                <a:ea typeface="+mn-ea"/>
+                <a:cs typeface="+mn-cs"/>
+              </a:defRPr>
+            </a:lvl7pPr>
+            <a:lvl8pPr marL="3429000" indent="-228600" algn="l" defTabSz="914400" rtl="0" eaLnBrk="1" latinLnBrk="0" hangingPunct="1">
+              <a:lnSpc>
+                <a:spcPct val="90000"/>
+              </a:lnSpc>
+              <a:spcBef>
+                <a:spcPts val="500"/>
+              </a:spcBef>
+              <a:buFont typeface="Arial" panose="020B0604020202020204" pitchFamily="34" charset="0"/>
+              <a:buChar char="•"/>
+              <a:defRPr sz="1800" kern="1200">
+                <a:solidFill>
+                  <a:schemeClr val="tx1"/>
+                </a:solidFill>
+                <a:latin typeface="+mn-lt"/>
+                <a:ea typeface="+mn-ea"/>
+                <a:cs typeface="+mn-cs"/>
+              </a:defRPr>
+            </a:lvl8pPr>
+            <a:lvl9pPr marL="3886200" indent="-228600" algn="l" defTabSz="914400" rtl="0" eaLnBrk="1" latinLnBrk="0" hangingPunct="1">
+              <a:lnSpc>
+                <a:spcPct val="90000"/>
+              </a:lnSpc>
+              <a:spcBef>
+                <a:spcPts val="500"/>
+              </a:spcBef>
+              <a:buFont typeface="Arial" panose="020B0604020202020204" pitchFamily="34" charset="0"/>
+              <a:buChar char="•"/>
+              <a:defRPr sz="1800" kern="1200">
+                <a:solidFill>
+                  <a:schemeClr val="tx1"/>
+                </a:solidFill>
+                <a:latin typeface="+mn-lt"/>
+                <a:ea typeface="+mn-ea"/>
+                <a:cs typeface="+mn-cs"/>
+              </a:defRPr>
+            </a:lvl9pPr>
+          </a:lstStyle>
+          <a:p>
+            <a:r>
+              <a:rPr lang="en-US" dirty="0"/>
+              <a:t>The dominant languages of Top 10 frequent languages were English and French. See </a:t>
+            </a:r>
+            <a:r>
+              <a:rPr lang="en-US" dirty="0">
+                <a:solidFill>
+                  <a:schemeClr val="tx1"/>
+                </a:solidFill>
+              </a:rPr>
+              <a:t>Figure 3</a:t>
+            </a:r>
+          </a:p>
+        </p:txBody>
+      </p:sp>
+    </p:spTree>
+    <p:extLst>
+      <p:ext uri="{BB962C8B-B14F-4D97-AF65-F5344CB8AC3E}">
+        <p14:creationId xmlns:p14="http://schemas.microsoft.com/office/powerpoint/2010/main" val="527061044"/>
+      </p:ext>
+    </p:extLst>
+  </p:cSld>
+  <p:clrMapOvr>
+    <a:masterClrMapping/>
+  </p:clrMapOvr>
+</p:sld>
+</file>
+
+<file path=ppt/slides/slide11.xml><?xml version="1.0" encoding="utf-8"?>
+<p:sld xmlns:a="http://schemas.openxmlformats.org/drawingml/2006/main" xmlns:r="http://schemas.openxmlformats.org/officeDocument/2006/relationships" xmlns:p="http://schemas.openxmlformats.org/presentationml/2006/main">
+  <p:cSld>
+    <p:spTree>
+      <p:nvGrpSpPr>
+        <p:cNvPr id="1" name=""/>
+        <p:cNvGrpSpPr/>
+        <p:nvPr/>
+      </p:nvGrpSpPr>
+      <p:grpSpPr>
+        <a:xfrm>
+          <a:off x="0" y="0"/>
+          <a:ext cx="0" cy="0"/>
+          <a:chOff x="0" y="0"/>
+          <a:chExt cx="0" cy="0"/>
+        </a:xfrm>
+      </p:grpSpPr>
+      <p:pic>
+        <p:nvPicPr>
+          <p:cNvPr id="10" name="Picture 9">
+            <a:extLst>
+              <a:ext uri="{FF2B5EF4-FFF2-40B4-BE49-F238E27FC236}">
+                <a16:creationId xmlns:a16="http://schemas.microsoft.com/office/drawing/2014/main" id="{AC7CCD37-7347-BAB8-5C56-1895E93A3C02}"/>
+              </a:ext>
+            </a:extLst>
+          </p:cNvPr>
+          <p:cNvPicPr>
+            <a:picLocks noChangeAspect="1"/>
+          </p:cNvPicPr>
+          <p:nvPr/>
+        </p:nvPicPr>
+        <p:blipFill>
+          <a:blip r:embed="rId2"/>
+          <a:stretch>
+            <a:fillRect/>
+          </a:stretch>
+        </p:blipFill>
+        <p:spPr>
+          <a:xfrm>
+            <a:off x="580541" y="2625302"/>
+            <a:ext cx="5492560" cy="3773079"/>
+          </a:xfrm>
+          <a:prstGeom prst="rect">
+            <a:avLst/>
+          </a:prstGeom>
+        </p:spPr>
+      </p:pic>
+      <p:pic>
+        <p:nvPicPr>
+          <p:cNvPr id="8" name="Picture 7">
+            <a:extLst>
+              <a:ext uri="{FF2B5EF4-FFF2-40B4-BE49-F238E27FC236}">
+                <a16:creationId xmlns:a16="http://schemas.microsoft.com/office/drawing/2014/main" id="{BFFD1F16-286C-DE8E-4B0B-FFF62EB9A9A6}"/>
+              </a:ext>
+            </a:extLst>
+          </p:cNvPr>
+          <p:cNvPicPr>
+            <a:picLocks noChangeAspect="1"/>
+          </p:cNvPicPr>
+          <p:nvPr/>
+        </p:nvPicPr>
+        <p:blipFill>
+          <a:blip r:embed="rId3"/>
+          <a:stretch>
+            <a:fillRect/>
+          </a:stretch>
+        </p:blipFill>
+        <p:spPr>
+          <a:xfrm>
+            <a:off x="5685615" y="1070812"/>
+            <a:ext cx="6506385" cy="3872984"/>
+          </a:xfrm>
+          <a:prstGeom prst="rect">
+            <a:avLst/>
+          </a:prstGeom>
+        </p:spPr>
+      </p:pic>
+      <p:sp>
+        <p:nvSpPr>
+          <p:cNvPr id="3" name="Content Placeholder 2">
+            <a:extLst>
+              <a:ext uri="{FF2B5EF4-FFF2-40B4-BE49-F238E27FC236}">
+                <a16:creationId xmlns:a16="http://schemas.microsoft.com/office/drawing/2014/main" id="{71CA85DD-FC5D-BF31-6D5E-1E34845AD7E0}"/>
+              </a:ext>
+            </a:extLst>
+          </p:cNvPr>
+          <p:cNvSpPr>
+            <a:spLocks noGrp="1"/>
+          </p:cNvSpPr>
+          <p:nvPr>
+            <p:ph idx="1"/>
+          </p:nvPr>
+        </p:nvSpPr>
+        <p:spPr>
+          <a:xfrm>
+            <a:off x="580541" y="1688859"/>
+            <a:ext cx="5879592" cy="768096"/>
+          </a:xfrm>
+        </p:spPr>
+        <p:txBody>
+          <a:bodyPr/>
+          <a:lstStyle/>
+          <a:p>
+            <a:pPr marL="342900" indent="-342900">
+              <a:buFont typeface="Arial" panose="020B0604020202020204" pitchFamily="34" charset="0"/>
+              <a:buChar char="•"/>
+            </a:pPr>
+            <a:r>
+              <a:rPr lang="en-US" sz="1800" dirty="0"/>
+              <a:t>The Top biggest player in number of Studios `BV` and `Uni` are the Best Performing Studio thus far. See </a:t>
+            </a:r>
+            <a:r>
+              <a:rPr lang="en-US" sz="1800" b="1" dirty="0">
+                <a:solidFill>
+                  <a:schemeClr val="tx1"/>
+                </a:solidFill>
+              </a:rPr>
+              <a:t>Figure 4</a:t>
+            </a:r>
+          </a:p>
+        </p:txBody>
+      </p:sp>
+      <p:sp>
+        <p:nvSpPr>
+          <p:cNvPr id="4" name="Slide Number Placeholder 3">
+            <a:extLst>
+              <a:ext uri="{FF2B5EF4-FFF2-40B4-BE49-F238E27FC236}">
+                <a16:creationId xmlns:a16="http://schemas.microsoft.com/office/drawing/2014/main" id="{1A06B468-E66E-9F04-41B3-B68E7A9EC0ED}"/>
+              </a:ext>
+            </a:extLst>
+          </p:cNvPr>
+          <p:cNvSpPr>
+            <a:spLocks noGrp="1"/>
+          </p:cNvSpPr>
+          <p:nvPr>
+            <p:ph type="sldNum" sz="quarter" idx="12"/>
+          </p:nvPr>
+        </p:nvSpPr>
+        <p:spPr/>
+        <p:txBody>
+          <a:bodyPr/>
+          <a:lstStyle/>
+          <a:p>
+            <a:fld id="{48F63A3B-78C7-47BE-AE5E-E10140E04643}" type="slidenum">
+              <a:rPr lang="en-US" smtClean="0"/>
+              <a:t>11</a:t>
+            </a:fld>
+            <a:endParaRPr lang="en-US" dirty="0"/>
+          </a:p>
+        </p:txBody>
+      </p:sp>
+      <p:sp>
+        <p:nvSpPr>
+          <p:cNvPr id="6" name="Title 1">
+            <a:extLst>
+              <a:ext uri="{FF2B5EF4-FFF2-40B4-BE49-F238E27FC236}">
+                <a16:creationId xmlns:a16="http://schemas.microsoft.com/office/drawing/2014/main" id="{473E725F-02DC-57DE-E3A2-C5750CED2899}"/>
+              </a:ext>
+            </a:extLst>
+          </p:cNvPr>
+          <p:cNvSpPr>
+            <a:spLocks noGrp="1"/>
+          </p:cNvSpPr>
+          <p:nvPr>
+            <p:ph type="title"/>
+          </p:nvPr>
+        </p:nvSpPr>
+        <p:spPr>
+          <a:xfrm>
+            <a:off x="444370" y="302716"/>
+            <a:ext cx="7662399" cy="768096"/>
+          </a:xfrm>
+        </p:spPr>
+        <p:txBody>
+          <a:bodyPr/>
+          <a:lstStyle/>
+          <a:p>
+            <a:r>
+              <a:rPr lang="en-US" dirty="0">
+                <a:solidFill>
+                  <a:schemeClr val="accent1">
+                    <a:lumMod val="50000"/>
+                  </a:schemeClr>
+                </a:solidFill>
+              </a:rPr>
+              <a:t>Best studios along regions</a:t>
+            </a:r>
+          </a:p>
+        </p:txBody>
+      </p:sp>
+      <p:sp>
+        <p:nvSpPr>
+          <p:cNvPr id="11" name="TextBox 10">
+            <a:extLst>
+              <a:ext uri="{FF2B5EF4-FFF2-40B4-BE49-F238E27FC236}">
+                <a16:creationId xmlns:a16="http://schemas.microsoft.com/office/drawing/2014/main" id="{D82C045F-719E-CDB3-7826-377B1923D911}"/>
+              </a:ext>
+            </a:extLst>
+          </p:cNvPr>
+          <p:cNvSpPr txBox="1"/>
+          <p:nvPr/>
+        </p:nvSpPr>
+        <p:spPr>
+          <a:xfrm>
+            <a:off x="6655796" y="4759130"/>
+            <a:ext cx="1515979" cy="369332"/>
+          </a:xfrm>
+          <a:prstGeom prst="rect">
+            <a:avLst/>
+          </a:prstGeom>
+          <a:noFill/>
+        </p:spPr>
+        <p:txBody>
+          <a:bodyPr wrap="square" rtlCol="0">
+            <a:spAutoFit/>
+          </a:bodyPr>
+          <a:lstStyle/>
+          <a:p>
+            <a:r>
+              <a:rPr lang="en-US" sz="1800" b="1" dirty="0">
+                <a:solidFill>
+                  <a:schemeClr val="tx1"/>
+                </a:solidFill>
+              </a:rPr>
+              <a:t>Figure 4</a:t>
+            </a:r>
+          </a:p>
+        </p:txBody>
+      </p:sp>
+      <p:sp>
+        <p:nvSpPr>
+          <p:cNvPr id="12" name="TextBox 11">
+            <a:extLst>
+              <a:ext uri="{FF2B5EF4-FFF2-40B4-BE49-F238E27FC236}">
+                <a16:creationId xmlns:a16="http://schemas.microsoft.com/office/drawing/2014/main" id="{23D8B890-2F8B-8C36-3B63-99D817F70B93}"/>
+              </a:ext>
+            </a:extLst>
+          </p:cNvPr>
+          <p:cNvSpPr txBox="1"/>
+          <p:nvPr/>
+        </p:nvSpPr>
+        <p:spPr>
+          <a:xfrm>
+            <a:off x="4508994" y="6213715"/>
+            <a:ext cx="1515979" cy="369332"/>
+          </a:xfrm>
+          <a:prstGeom prst="rect">
+            <a:avLst/>
+          </a:prstGeom>
+          <a:noFill/>
+        </p:spPr>
+        <p:txBody>
+          <a:bodyPr wrap="square" rtlCol="0">
+            <a:spAutoFit/>
+          </a:bodyPr>
+          <a:lstStyle/>
+          <a:p>
+            <a:r>
+              <a:rPr lang="en-US" sz="1800" b="1" dirty="0">
+                <a:solidFill>
+                  <a:schemeClr val="tx1"/>
+                </a:solidFill>
+              </a:rPr>
+              <a:t>Figure 5</a:t>
+            </a:r>
+          </a:p>
+        </p:txBody>
+      </p:sp>
+      <p:sp>
+        <p:nvSpPr>
+          <p:cNvPr id="13" name="TextBox 12">
+            <a:extLst>
+              <a:ext uri="{FF2B5EF4-FFF2-40B4-BE49-F238E27FC236}">
+                <a16:creationId xmlns:a16="http://schemas.microsoft.com/office/drawing/2014/main" id="{BAD17319-522B-A509-E39D-80BE590419C7}"/>
+              </a:ext>
+            </a:extLst>
+          </p:cNvPr>
+          <p:cNvSpPr txBox="1"/>
+          <p:nvPr/>
+        </p:nvSpPr>
+        <p:spPr>
+          <a:xfrm>
+            <a:off x="6244389" y="5233737"/>
+            <a:ext cx="5688531" cy="923330"/>
+          </a:xfrm>
+          <a:prstGeom prst="rect">
+            <a:avLst/>
+          </a:prstGeom>
+          <a:noFill/>
+        </p:spPr>
+        <p:txBody>
+          <a:bodyPr wrap="square" rtlCol="0">
+            <a:spAutoFit/>
+          </a:bodyPr>
+          <a:lstStyle/>
+          <a:p>
+            <a:pPr marL="285750" indent="-285750">
+              <a:buFont typeface="Arial" panose="020B0604020202020204" pitchFamily="34" charset="0"/>
+              <a:buChar char="•"/>
+            </a:pPr>
+            <a:r>
+              <a:rPr lang="en-US" sz="1800" dirty="0">
+                <a:solidFill>
+                  <a:srgbClr val="002060"/>
+                </a:solidFill>
+              </a:rPr>
+              <a:t>The most preferred Region in number of Studios was seen to </a:t>
+            </a:r>
+            <a:r>
+              <a:rPr lang="en-US" dirty="0">
+                <a:solidFill>
+                  <a:srgbClr val="002060"/>
+                </a:solidFill>
+              </a:rPr>
+              <a:t>be </a:t>
+            </a:r>
+            <a:r>
+              <a:rPr lang="en-US" dirty="0">
+                <a:solidFill>
+                  <a:schemeClr val="accent1">
+                    <a:lumMod val="50000"/>
+                  </a:schemeClr>
+                </a:solidFill>
+              </a:rPr>
+              <a:t>`US` </a:t>
+            </a:r>
+            <a:r>
+              <a:rPr lang="en-US" dirty="0">
+                <a:solidFill>
+                  <a:srgbClr val="002060"/>
+                </a:solidFill>
+              </a:rPr>
+              <a:t>and </a:t>
+            </a:r>
+            <a:r>
+              <a:rPr lang="en-US" dirty="0">
+                <a:solidFill>
+                  <a:schemeClr val="accent1">
+                    <a:lumMod val="50000"/>
+                  </a:schemeClr>
+                </a:solidFill>
+              </a:rPr>
+              <a:t>`XWW` </a:t>
+            </a:r>
+            <a:r>
+              <a:rPr lang="en-US" sz="1800" dirty="0">
+                <a:solidFill>
+                  <a:srgbClr val="002060"/>
+                </a:solidFill>
+              </a:rPr>
+              <a:t>as seen in </a:t>
+            </a:r>
+            <a:r>
+              <a:rPr lang="en-US" sz="1800" b="1" dirty="0"/>
+              <a:t>Figure 5</a:t>
+            </a:r>
+            <a:endParaRPr lang="en-US" sz="1800" dirty="0"/>
+          </a:p>
+          <a:p>
+            <a:pPr marL="285750" indent="-285750">
+              <a:buFont typeface="Arial" panose="020B0604020202020204" pitchFamily="34" charset="0"/>
+              <a:buChar char="•"/>
+            </a:pPr>
+            <a:endParaRPr lang="en-US" dirty="0"/>
+          </a:p>
+        </p:txBody>
+      </p:sp>
+    </p:spTree>
+    <p:extLst>
+      <p:ext uri="{BB962C8B-B14F-4D97-AF65-F5344CB8AC3E}">
+        <p14:creationId xmlns:p14="http://schemas.microsoft.com/office/powerpoint/2010/main" val="1078057720"/>
+      </p:ext>
+    </p:extLst>
+  </p:cSld>
+  <p:clrMapOvr>
+    <a:masterClrMapping/>
+  </p:clrMapOvr>
+</p:sld>
+</file>
+
+<file path=ppt/slides/slide12.xml><?xml version="1.0" encoding="utf-8"?>
+<p:sld xmlns:a="http://schemas.openxmlformats.org/drawingml/2006/main" xmlns:r="http://schemas.openxmlformats.org/officeDocument/2006/relationships" xmlns:p="http://schemas.openxmlformats.org/presentationml/2006/main">
+  <p:cSld>
+    <p:spTree>
+      <p:nvGrpSpPr>
+        <p:cNvPr id="1" name=""/>
+        <p:cNvGrpSpPr/>
+        <p:nvPr/>
+      </p:nvGrpSpPr>
+      <p:grpSpPr>
+        <a:xfrm>
+          <a:off x="0" y="0"/>
+          <a:ext cx="0" cy="0"/>
+          <a:chOff x="0" y="0"/>
+          <a:chExt cx="0" cy="0"/>
+        </a:xfrm>
+      </p:grpSpPr>
+      <p:sp>
+        <p:nvSpPr>
+          <p:cNvPr id="2" name="Title 1">
+            <a:extLst>
+              <a:ext uri="{FF2B5EF4-FFF2-40B4-BE49-F238E27FC236}">
+                <a16:creationId xmlns:a16="http://schemas.microsoft.com/office/drawing/2014/main" id="{440F04C1-0F00-B295-A59B-C30735926518}"/>
+              </a:ext>
+            </a:extLst>
+          </p:cNvPr>
+          <p:cNvSpPr>
+            <a:spLocks noGrp="1"/>
+          </p:cNvSpPr>
+          <p:nvPr>
+            <p:ph type="title"/>
+          </p:nvPr>
+        </p:nvSpPr>
+        <p:spPr>
+          <a:xfrm>
+            <a:off x="621792" y="457200"/>
+            <a:ext cx="6766560" cy="768096"/>
+          </a:xfrm>
+        </p:spPr>
+        <p:txBody>
+          <a:bodyPr/>
+          <a:lstStyle/>
+          <a:p>
+            <a:r>
+              <a:rPr lang="en-US" dirty="0">
+                <a:solidFill>
+                  <a:schemeClr val="accent1">
+                    <a:lumMod val="50000"/>
+                  </a:schemeClr>
+                </a:solidFill>
+              </a:rPr>
+              <a:t>GENRES</a:t>
+            </a:r>
+          </a:p>
+        </p:txBody>
+      </p:sp>
+      <p:pic>
+        <p:nvPicPr>
+          <p:cNvPr id="7" name="Content Placeholder 6">
+            <a:extLst>
+              <a:ext uri="{FF2B5EF4-FFF2-40B4-BE49-F238E27FC236}">
+                <a16:creationId xmlns:a16="http://schemas.microsoft.com/office/drawing/2014/main" id="{A0CA870B-565B-7256-B240-0AED4E7B7540}"/>
+              </a:ext>
+            </a:extLst>
+          </p:cNvPr>
+          <p:cNvPicPr>
+            <a:picLocks noGrp="1" noChangeAspect="1"/>
+          </p:cNvPicPr>
+          <p:nvPr>
+            <p:ph idx="1"/>
+          </p:nvPr>
+        </p:nvPicPr>
+        <p:blipFill>
+          <a:blip r:embed="rId2"/>
+          <a:stretch>
+            <a:fillRect/>
+          </a:stretch>
+        </p:blipFill>
+        <p:spPr>
+          <a:xfrm>
+            <a:off x="5166360" y="347472"/>
+            <a:ext cx="6766560" cy="4716691"/>
+          </a:xfrm>
+        </p:spPr>
+      </p:pic>
+      <p:sp>
+        <p:nvSpPr>
+          <p:cNvPr id="4" name="Slide Number Placeholder 3">
+            <a:extLst>
+              <a:ext uri="{FF2B5EF4-FFF2-40B4-BE49-F238E27FC236}">
+                <a16:creationId xmlns:a16="http://schemas.microsoft.com/office/drawing/2014/main" id="{595BFB2B-D0F2-0AD5-9065-BEBE359C2289}"/>
+              </a:ext>
+            </a:extLst>
+          </p:cNvPr>
+          <p:cNvSpPr>
+            <a:spLocks noGrp="1"/>
+          </p:cNvSpPr>
+          <p:nvPr>
+            <p:ph type="sldNum" sz="quarter" idx="12"/>
+          </p:nvPr>
+        </p:nvSpPr>
+        <p:spPr/>
+        <p:txBody>
+          <a:bodyPr/>
+          <a:lstStyle/>
+          <a:p>
+            <a:fld id="{48F63A3B-78C7-47BE-AE5E-E10140E04643}" type="slidenum">
+              <a:rPr lang="en-US" smtClean="0"/>
+              <a:t>12</a:t>
+            </a:fld>
+            <a:endParaRPr lang="en-US" dirty="0"/>
+          </a:p>
+        </p:txBody>
+      </p:sp>
+      <p:sp>
+        <p:nvSpPr>
+          <p:cNvPr id="8" name="TextBox 7">
+            <a:extLst>
+              <a:ext uri="{FF2B5EF4-FFF2-40B4-BE49-F238E27FC236}">
+                <a16:creationId xmlns:a16="http://schemas.microsoft.com/office/drawing/2014/main" id="{BF14CF0E-6C4B-E830-0EC9-0E755AFDC78E}"/>
+              </a:ext>
+            </a:extLst>
+          </p:cNvPr>
+          <p:cNvSpPr txBox="1"/>
+          <p:nvPr/>
+        </p:nvSpPr>
+        <p:spPr>
+          <a:xfrm>
+            <a:off x="384529" y="1328527"/>
+            <a:ext cx="5069145" cy="923330"/>
+          </a:xfrm>
+          <a:prstGeom prst="rect">
+            <a:avLst/>
+          </a:prstGeom>
+          <a:noFill/>
+        </p:spPr>
+        <p:txBody>
+          <a:bodyPr wrap="square" rtlCol="0">
+            <a:spAutoFit/>
+          </a:bodyPr>
+          <a:lstStyle/>
+          <a:p>
+            <a:pPr marL="285750" indent="-285750">
+              <a:buFont typeface="Arial" panose="020B0604020202020204" pitchFamily="34" charset="0"/>
+              <a:buChar char="•"/>
+            </a:pPr>
+            <a:r>
+              <a:rPr lang="en-US" dirty="0">
+                <a:solidFill>
+                  <a:srgbClr val="0070C0"/>
+                </a:solidFill>
+              </a:rPr>
+              <a:t>The Best performing genre in ether markets were </a:t>
+            </a:r>
+            <a:r>
+              <a:rPr lang="en-US" i="1" dirty="0">
+                <a:solidFill>
+                  <a:srgbClr val="FF0000"/>
+                </a:solidFill>
+              </a:rPr>
+              <a:t>Drama, Action, Fantasy, Music </a:t>
+            </a:r>
+            <a:r>
+              <a:rPr lang="en-US" dirty="0">
+                <a:solidFill>
+                  <a:srgbClr val="0070C0"/>
+                </a:solidFill>
+              </a:rPr>
+              <a:t>and</a:t>
+            </a:r>
+            <a:r>
+              <a:rPr lang="en-US" dirty="0">
+                <a:solidFill>
+                  <a:srgbClr val="FF0000"/>
+                </a:solidFill>
+              </a:rPr>
+              <a:t> </a:t>
+            </a:r>
+            <a:r>
+              <a:rPr lang="en-US" i="1" dirty="0">
+                <a:solidFill>
+                  <a:srgbClr val="FF0000"/>
+                </a:solidFill>
+              </a:rPr>
+              <a:t>Romance</a:t>
+            </a:r>
+            <a:r>
+              <a:rPr lang="en-US" dirty="0">
+                <a:solidFill>
+                  <a:srgbClr val="FF0000"/>
+                </a:solidFill>
+              </a:rPr>
+              <a:t>. </a:t>
+            </a:r>
+            <a:r>
+              <a:rPr lang="en-US" dirty="0">
+                <a:solidFill>
+                  <a:srgbClr val="0070C0"/>
+                </a:solidFill>
+              </a:rPr>
+              <a:t> See </a:t>
+            </a:r>
+            <a:r>
+              <a:rPr lang="en-US" b="1" dirty="0"/>
+              <a:t>Figure 7.</a:t>
+            </a:r>
+          </a:p>
+        </p:txBody>
+      </p:sp>
+      <p:pic>
+        <p:nvPicPr>
+          <p:cNvPr id="15" name="Picture 14">
+            <a:extLst>
+              <a:ext uri="{FF2B5EF4-FFF2-40B4-BE49-F238E27FC236}">
+                <a16:creationId xmlns:a16="http://schemas.microsoft.com/office/drawing/2014/main" id="{D1EF8D70-1E54-A2FB-1425-040417951042}"/>
+              </a:ext>
+            </a:extLst>
+          </p:cNvPr>
+          <p:cNvPicPr>
+            <a:picLocks noChangeAspect="1"/>
+          </p:cNvPicPr>
+          <p:nvPr/>
+        </p:nvPicPr>
+        <p:blipFill>
+          <a:blip r:embed="rId3"/>
+          <a:stretch>
+            <a:fillRect/>
+          </a:stretch>
+        </p:blipFill>
+        <p:spPr>
+          <a:xfrm>
+            <a:off x="308876" y="4512924"/>
+            <a:ext cx="5170400" cy="1994879"/>
+          </a:xfrm>
+          <a:prstGeom prst="rect">
+            <a:avLst/>
+          </a:prstGeom>
+        </p:spPr>
+      </p:pic>
+      <p:sp>
+        <p:nvSpPr>
+          <p:cNvPr id="10" name="TextBox 9">
+            <a:extLst>
+              <a:ext uri="{FF2B5EF4-FFF2-40B4-BE49-F238E27FC236}">
+                <a16:creationId xmlns:a16="http://schemas.microsoft.com/office/drawing/2014/main" id="{16DB4FC4-EAE9-1C4F-9A81-65E38692A53B}"/>
+              </a:ext>
+            </a:extLst>
+          </p:cNvPr>
+          <p:cNvSpPr txBox="1"/>
+          <p:nvPr/>
+        </p:nvSpPr>
+        <p:spPr>
+          <a:xfrm>
+            <a:off x="10074442" y="4512924"/>
+            <a:ext cx="2117558" cy="369332"/>
+          </a:xfrm>
+          <a:prstGeom prst="rect">
+            <a:avLst/>
+          </a:prstGeom>
+          <a:noFill/>
+        </p:spPr>
+        <p:txBody>
+          <a:bodyPr wrap="square" rtlCol="0">
+            <a:spAutoFit/>
+          </a:bodyPr>
+          <a:lstStyle/>
+          <a:p>
+            <a:r>
+              <a:rPr lang="en-US" b="1" dirty="0"/>
+              <a:t>Figure 7</a:t>
+            </a:r>
+            <a:endParaRPr lang="en-US" dirty="0"/>
+          </a:p>
+        </p:txBody>
+      </p:sp>
+      <p:sp>
+        <p:nvSpPr>
+          <p:cNvPr id="11" name="Title 1">
+            <a:extLst>
+              <a:ext uri="{FF2B5EF4-FFF2-40B4-BE49-F238E27FC236}">
+                <a16:creationId xmlns:a16="http://schemas.microsoft.com/office/drawing/2014/main" id="{2D6BEA82-99F6-8E6F-D04D-97C77B19077E}"/>
+              </a:ext>
+            </a:extLst>
+          </p:cNvPr>
+          <p:cNvSpPr txBox="1">
+            <a:spLocks/>
+          </p:cNvSpPr>
+          <p:nvPr/>
+        </p:nvSpPr>
+        <p:spPr>
+          <a:xfrm>
+            <a:off x="621792" y="2333799"/>
+            <a:ext cx="6766560" cy="455190"/>
+          </a:xfrm>
+          <a:prstGeom prst="rect">
+            <a:avLst/>
+          </a:prstGeom>
+        </p:spPr>
+        <p:txBody>
+          <a:bodyPr vert="horz" lIns="91440" tIns="45720" rIns="91440" bIns="45720" rtlCol="0" anchor="t">
+            <a:noAutofit/>
+          </a:bodyPr>
+          <a:lstStyle>
+            <a:lvl1pPr algn="l" defTabSz="914400" rtl="0" eaLnBrk="1" latinLnBrk="0" hangingPunct="1">
+              <a:lnSpc>
+                <a:spcPct val="100000"/>
+              </a:lnSpc>
+              <a:spcBef>
+                <a:spcPct val="0"/>
+              </a:spcBef>
+              <a:buNone/>
+              <a:defRPr sz="4400" b="1" kern="1200" cap="all" baseline="0">
+                <a:solidFill>
+                  <a:schemeClr val="accent6"/>
+                </a:solidFill>
+                <a:latin typeface="+mj-lt"/>
+                <a:ea typeface="+mj-ea"/>
+                <a:cs typeface="+mj-cs"/>
+              </a:defRPr>
+            </a:lvl1pPr>
+          </a:lstStyle>
+          <a:p>
+            <a:r>
+              <a:rPr lang="en-US" dirty="0">
+                <a:solidFill>
+                  <a:schemeClr val="accent1">
+                    <a:lumMod val="50000"/>
+                  </a:schemeClr>
+                </a:solidFill>
+              </a:rPr>
+              <a:t>Best film</a:t>
+            </a:r>
+          </a:p>
+          <a:p>
+            <a:r>
+              <a:rPr lang="en-US" dirty="0">
+                <a:solidFill>
+                  <a:schemeClr val="accent1">
+                    <a:lumMod val="50000"/>
+                  </a:schemeClr>
+                </a:solidFill>
+              </a:rPr>
+              <a:t>Runtime</a:t>
+            </a:r>
+          </a:p>
+        </p:txBody>
+      </p:sp>
+      <p:sp>
+        <p:nvSpPr>
+          <p:cNvPr id="12" name="TextBox 11">
+            <a:extLst>
+              <a:ext uri="{FF2B5EF4-FFF2-40B4-BE49-F238E27FC236}">
+                <a16:creationId xmlns:a16="http://schemas.microsoft.com/office/drawing/2014/main" id="{AE6D85C7-F4FD-D6D1-5B77-6F7AD370DD60}"/>
+              </a:ext>
+            </a:extLst>
+          </p:cNvPr>
+          <p:cNvSpPr txBox="1"/>
+          <p:nvPr/>
+        </p:nvSpPr>
+        <p:spPr>
+          <a:xfrm>
+            <a:off x="384529" y="3760115"/>
+            <a:ext cx="4072295" cy="923330"/>
+          </a:xfrm>
+          <a:prstGeom prst="rect">
+            <a:avLst/>
+          </a:prstGeom>
+          <a:noFill/>
+        </p:spPr>
+        <p:txBody>
+          <a:bodyPr wrap="square" rtlCol="0">
+            <a:spAutoFit/>
+          </a:bodyPr>
+          <a:lstStyle/>
+          <a:p>
+            <a:pPr marL="285750" indent="-285750" algn="just">
+              <a:buFont typeface="Arial" panose="020B0604020202020204" pitchFamily="34" charset="0"/>
+              <a:buChar char="•"/>
+            </a:pPr>
+            <a:r>
+              <a:rPr lang="en-US" dirty="0">
+                <a:solidFill>
+                  <a:srgbClr val="0070C0"/>
+                </a:solidFill>
+              </a:rPr>
+              <a:t>The Average and best performing length of film was </a:t>
+            </a:r>
+            <a:r>
+              <a:rPr lang="en-US" b="1" i="1" dirty="0"/>
+              <a:t>94 minutes </a:t>
+            </a:r>
+            <a:r>
+              <a:rPr lang="en-US" dirty="0">
+                <a:solidFill>
+                  <a:srgbClr val="0070C0"/>
+                </a:solidFill>
+              </a:rPr>
+              <a:t>as seen in </a:t>
+            </a:r>
+            <a:r>
+              <a:rPr lang="en-US" b="1" dirty="0"/>
+              <a:t>Figure 8.</a:t>
+            </a:r>
+          </a:p>
+        </p:txBody>
+      </p:sp>
+      <p:sp>
+        <p:nvSpPr>
+          <p:cNvPr id="13" name="TextBox 12">
+            <a:extLst>
+              <a:ext uri="{FF2B5EF4-FFF2-40B4-BE49-F238E27FC236}">
+                <a16:creationId xmlns:a16="http://schemas.microsoft.com/office/drawing/2014/main" id="{8E1E6A54-DF5C-D6E6-5E5C-B25FB0FA76B7}"/>
+              </a:ext>
+            </a:extLst>
+          </p:cNvPr>
+          <p:cNvSpPr txBox="1"/>
+          <p:nvPr/>
+        </p:nvSpPr>
+        <p:spPr>
+          <a:xfrm>
+            <a:off x="5270794" y="5829191"/>
+            <a:ext cx="2117558" cy="369332"/>
+          </a:xfrm>
+          <a:prstGeom prst="rect">
+            <a:avLst/>
+          </a:prstGeom>
+          <a:noFill/>
+        </p:spPr>
+        <p:txBody>
+          <a:bodyPr wrap="square" rtlCol="0">
+            <a:spAutoFit/>
+          </a:bodyPr>
+          <a:lstStyle/>
+          <a:p>
+            <a:r>
+              <a:rPr lang="en-US" b="1" dirty="0"/>
+              <a:t>Figure 8</a:t>
+            </a:r>
+            <a:endParaRPr lang="en-US" dirty="0"/>
+          </a:p>
+        </p:txBody>
+      </p:sp>
+    </p:spTree>
+    <p:extLst>
+      <p:ext uri="{BB962C8B-B14F-4D97-AF65-F5344CB8AC3E}">
+        <p14:creationId xmlns:p14="http://schemas.microsoft.com/office/powerpoint/2010/main" val="27675900"/>
+      </p:ext>
+    </p:extLst>
+  </p:cSld>
+  <p:clrMapOvr>
+    <a:masterClrMapping/>
+  </p:clrMapOvr>
+</p:sld>
+</file>
+
+<file path=ppt/slides/slide13.xml><?xml version="1.0" encoding="utf-8"?>
+<p:sld xmlns:a="http://schemas.openxmlformats.org/drawingml/2006/main" xmlns:r="http://schemas.openxmlformats.org/officeDocument/2006/relationships" xmlns:p="http://schemas.openxmlformats.org/presentationml/2006/main">
+  <p:cSld>
+    <p:spTree>
+      <p:nvGrpSpPr>
+        <p:cNvPr id="1" name=""/>
+        <p:cNvGrpSpPr/>
+        <p:nvPr/>
+      </p:nvGrpSpPr>
+      <p:grpSpPr>
+        <a:xfrm>
+          <a:off x="0" y="0"/>
+          <a:ext cx="0" cy="0"/>
+          <a:chOff x="0" y="0"/>
+          <a:chExt cx="0" cy="0"/>
+        </a:xfrm>
+      </p:grpSpPr>
+      <p:pic>
+        <p:nvPicPr>
+          <p:cNvPr id="11" name="Content Placeholder 10">
+            <a:extLst>
+              <a:ext uri="{FF2B5EF4-FFF2-40B4-BE49-F238E27FC236}">
+                <a16:creationId xmlns:a16="http://schemas.microsoft.com/office/drawing/2014/main" id="{76E090CC-CAFA-4E5A-C1A4-BCFF3A3676E0}"/>
+              </a:ext>
+            </a:extLst>
+          </p:cNvPr>
+          <p:cNvPicPr>
+            <a:picLocks noGrp="1" noChangeAspect="1"/>
+          </p:cNvPicPr>
+          <p:nvPr>
+            <p:ph sz="half" idx="1"/>
+          </p:nvPr>
+        </p:nvPicPr>
+        <p:blipFill>
+          <a:blip r:embed="rId2"/>
+          <a:stretch>
+            <a:fillRect/>
+          </a:stretch>
+        </p:blipFill>
+        <p:spPr>
+          <a:xfrm>
+            <a:off x="395785" y="1450074"/>
+            <a:ext cx="8186382" cy="4540714"/>
+          </a:xfrm>
+        </p:spPr>
+      </p:pic>
+      <p:sp>
+        <p:nvSpPr>
+          <p:cNvPr id="2" name="Title 1">
+            <a:extLst>
+              <a:ext uri="{FF2B5EF4-FFF2-40B4-BE49-F238E27FC236}">
+                <a16:creationId xmlns:a16="http://schemas.microsoft.com/office/drawing/2014/main" id="{25BABED8-3AC6-ABC6-F585-C12EB31F3E1D}"/>
+              </a:ext>
+            </a:extLst>
+          </p:cNvPr>
+          <p:cNvSpPr>
+            <a:spLocks noGrp="1"/>
+          </p:cNvSpPr>
+          <p:nvPr>
+            <p:ph type="title"/>
+          </p:nvPr>
+        </p:nvSpPr>
+        <p:spPr>
+          <a:xfrm>
+            <a:off x="1228298" y="503635"/>
+            <a:ext cx="6989973" cy="768096"/>
+          </a:xfrm>
+        </p:spPr>
+        <p:txBody>
+          <a:bodyPr/>
+          <a:lstStyle/>
+          <a:p>
+            <a:pPr algn="l"/>
+            <a:r>
+              <a:rPr lang="en-US" dirty="0">
+                <a:solidFill>
+                  <a:schemeClr val="accent1">
+                    <a:lumMod val="50000"/>
+                  </a:schemeClr>
+                </a:solidFill>
+              </a:rPr>
+              <a:t>language</a:t>
+            </a:r>
+          </a:p>
+        </p:txBody>
+      </p:sp>
+      <p:sp>
+        <p:nvSpPr>
+          <p:cNvPr id="5" name="Slide Number Placeholder 4">
+            <a:extLst>
+              <a:ext uri="{FF2B5EF4-FFF2-40B4-BE49-F238E27FC236}">
+                <a16:creationId xmlns:a16="http://schemas.microsoft.com/office/drawing/2014/main" id="{5426AD62-71A9-1FFE-2F69-90D073F1DFD5}"/>
+              </a:ext>
+            </a:extLst>
+          </p:cNvPr>
+          <p:cNvSpPr>
+            <a:spLocks noGrp="1"/>
+          </p:cNvSpPr>
+          <p:nvPr>
+            <p:ph type="sldNum" sz="quarter" idx="12"/>
+          </p:nvPr>
+        </p:nvSpPr>
+        <p:spPr/>
+        <p:txBody>
+          <a:bodyPr/>
+          <a:lstStyle/>
+          <a:p>
+            <a:fld id="{48F63A3B-78C7-47BE-AE5E-E10140E04643}" type="slidenum">
+              <a:rPr lang="en-US" smtClean="0"/>
+              <a:t>13</a:t>
+            </a:fld>
+            <a:endParaRPr lang="en-US" dirty="0"/>
+          </a:p>
+        </p:txBody>
+      </p:sp>
+      <p:sp>
+        <p:nvSpPr>
+          <p:cNvPr id="12" name="TextBox 11">
+            <a:extLst>
+              <a:ext uri="{FF2B5EF4-FFF2-40B4-BE49-F238E27FC236}">
+                <a16:creationId xmlns:a16="http://schemas.microsoft.com/office/drawing/2014/main" id="{EBD1B716-4BB8-A6AA-D20E-03AA77071060}"/>
+              </a:ext>
+            </a:extLst>
+          </p:cNvPr>
+          <p:cNvSpPr txBox="1"/>
+          <p:nvPr/>
+        </p:nvSpPr>
+        <p:spPr>
+          <a:xfrm>
+            <a:off x="8218271" y="1642939"/>
+            <a:ext cx="3714649" cy="4154984"/>
+          </a:xfrm>
+          <a:prstGeom prst="rect">
+            <a:avLst/>
+          </a:prstGeom>
+          <a:noFill/>
+        </p:spPr>
+        <p:txBody>
+          <a:bodyPr wrap="square" rtlCol="0">
+            <a:spAutoFit/>
+          </a:bodyPr>
+          <a:lstStyle/>
+          <a:p>
+            <a:r>
+              <a:rPr lang="en-US" sz="2400" b="1" dirty="0"/>
+              <a:t>INFERENCE:</a:t>
+            </a:r>
+          </a:p>
+          <a:p>
+            <a:endParaRPr lang="en-US" sz="2400" dirty="0"/>
+          </a:p>
+          <a:p>
+            <a:r>
+              <a:rPr lang="en-US" sz="2400" dirty="0"/>
+              <a:t>From this analysis, it was clearly shown that the top 10 performing languages included </a:t>
+            </a:r>
+            <a:r>
+              <a:rPr lang="en-US" sz="2400" i="1" dirty="0">
+                <a:solidFill>
+                  <a:srgbClr val="FF0000"/>
+                </a:solidFill>
+              </a:rPr>
+              <a:t>‘English’, ‘Thailand’,</a:t>
+            </a:r>
+            <a:r>
+              <a:rPr lang="en-US" sz="2400" dirty="0"/>
+              <a:t> </a:t>
+            </a:r>
+            <a:r>
+              <a:rPr lang="en-US" sz="2400" i="1" dirty="0">
+                <a:solidFill>
+                  <a:srgbClr val="FF0000"/>
+                </a:solidFill>
+              </a:rPr>
+              <a:t>‘French’ </a:t>
+            </a:r>
+            <a:r>
+              <a:rPr lang="en-US" sz="2400" dirty="0"/>
+              <a:t>and </a:t>
+            </a:r>
+            <a:r>
+              <a:rPr lang="en-US" sz="2400" i="1" dirty="0">
+                <a:solidFill>
+                  <a:srgbClr val="FF0000"/>
+                </a:solidFill>
+              </a:rPr>
+              <a:t>‘Russian’.</a:t>
+            </a:r>
+          </a:p>
+          <a:p>
+            <a:endParaRPr lang="en-US" sz="2400" i="1" dirty="0">
+              <a:solidFill>
+                <a:srgbClr val="FF0000"/>
+              </a:solidFill>
+            </a:endParaRPr>
+          </a:p>
+          <a:p>
+            <a:r>
+              <a:rPr lang="en-US" sz="2400" dirty="0"/>
+              <a:t>See</a:t>
+            </a:r>
+            <a:r>
+              <a:rPr lang="en-US" sz="2400" b="1" dirty="0"/>
+              <a:t> Figure 9</a:t>
+            </a:r>
+          </a:p>
+          <a:p>
+            <a:endParaRPr lang="en-US" sz="2400" i="1" dirty="0">
+              <a:solidFill>
+                <a:srgbClr val="FF0000"/>
+              </a:solidFill>
+            </a:endParaRPr>
+          </a:p>
+        </p:txBody>
+      </p:sp>
+      <p:sp>
+        <p:nvSpPr>
+          <p:cNvPr id="13" name="TextBox 12">
+            <a:extLst>
+              <a:ext uri="{FF2B5EF4-FFF2-40B4-BE49-F238E27FC236}">
+                <a16:creationId xmlns:a16="http://schemas.microsoft.com/office/drawing/2014/main" id="{240D4E7E-3C2D-745D-F842-5792D90D479D}"/>
+              </a:ext>
+            </a:extLst>
+          </p:cNvPr>
+          <p:cNvSpPr txBox="1"/>
+          <p:nvPr/>
+        </p:nvSpPr>
+        <p:spPr>
+          <a:xfrm>
+            <a:off x="1078173" y="5786651"/>
+            <a:ext cx="2156346" cy="369332"/>
+          </a:xfrm>
+          <a:prstGeom prst="rect">
+            <a:avLst/>
+          </a:prstGeom>
+          <a:noFill/>
+        </p:spPr>
+        <p:txBody>
+          <a:bodyPr wrap="square" rtlCol="0">
+            <a:spAutoFit/>
+          </a:bodyPr>
+          <a:lstStyle/>
+          <a:p>
+            <a:r>
+              <a:rPr lang="en-US" b="1" dirty="0"/>
+              <a:t>Figure 9</a:t>
+            </a:r>
+          </a:p>
+        </p:txBody>
+      </p:sp>
+    </p:spTree>
+    <p:extLst>
+      <p:ext uri="{BB962C8B-B14F-4D97-AF65-F5344CB8AC3E}">
+        <p14:creationId xmlns:p14="http://schemas.microsoft.com/office/powerpoint/2010/main" val="3699188427"/>
+      </p:ext>
+    </p:extLst>
+  </p:cSld>
+  <p:clrMapOvr>
+    <a:masterClrMapping/>
+  </p:clrMapOvr>
+</p:sld>
+</file>
+
+<file path=ppt/slides/slide14.xml><?xml version="1.0" encoding="utf-8"?>
+<p:sld xmlns:a="http://schemas.openxmlformats.org/drawingml/2006/main" xmlns:r="http://schemas.openxmlformats.org/officeDocument/2006/relationships" xmlns:p="http://schemas.openxmlformats.org/presentationml/2006/main">
+  <p:cSld>
+    <p:spTree>
+      <p:nvGrpSpPr>
+        <p:cNvPr id="1" name=""/>
+        <p:cNvGrpSpPr/>
+        <p:nvPr/>
+      </p:nvGrpSpPr>
+      <p:grpSpPr>
+        <a:xfrm>
+          <a:off x="0" y="0"/>
+          <a:ext cx="0" cy="0"/>
+          <a:chOff x="0" y="0"/>
+          <a:chExt cx="0" cy="0"/>
+        </a:xfrm>
+      </p:grpSpPr>
+      <p:sp>
+        <p:nvSpPr>
+          <p:cNvPr id="2" name="Title 1">
+            <a:extLst>
+              <a:ext uri="{FF2B5EF4-FFF2-40B4-BE49-F238E27FC236}">
+                <a16:creationId xmlns:a16="http://schemas.microsoft.com/office/drawing/2014/main" id="{86B309B0-6209-D3D0-9D5E-308B9F6E7303}"/>
+              </a:ext>
+            </a:extLst>
+          </p:cNvPr>
+          <p:cNvSpPr>
+            <a:spLocks noGrp="1"/>
+          </p:cNvSpPr>
+          <p:nvPr>
+            <p:ph type="title"/>
+          </p:nvPr>
+        </p:nvSpPr>
+        <p:spPr>
+          <a:xfrm>
+            <a:off x="2124897" y="469104"/>
+            <a:ext cx="10681252" cy="1070489"/>
+          </a:xfrm>
+        </p:spPr>
+        <p:txBody>
+          <a:bodyPr/>
+          <a:lstStyle/>
+          <a:p>
+            <a:pPr algn="ctr"/>
+            <a:r>
+              <a:rPr lang="en-US" dirty="0"/>
+              <a:t>Recommendations</a:t>
+            </a:r>
+          </a:p>
+        </p:txBody>
+      </p:sp>
+      <p:sp>
+        <p:nvSpPr>
+          <p:cNvPr id="25" name="Slide Number Placeholder 24">
+            <a:extLst>
+              <a:ext uri="{FF2B5EF4-FFF2-40B4-BE49-F238E27FC236}">
+                <a16:creationId xmlns:a16="http://schemas.microsoft.com/office/drawing/2014/main" id="{5058AE03-D409-0714-CCED-4548A9C92023}"/>
+              </a:ext>
+            </a:extLst>
+          </p:cNvPr>
+          <p:cNvSpPr>
+            <a:spLocks noGrp="1"/>
+          </p:cNvSpPr>
+          <p:nvPr>
+            <p:ph type="sldNum" sz="quarter" idx="12"/>
+          </p:nvPr>
+        </p:nvSpPr>
+        <p:spPr/>
+        <p:txBody>
+          <a:bodyPr/>
+          <a:lstStyle/>
+          <a:p>
+            <a:fld id="{48F63A3B-78C7-47BE-AE5E-E10140E04643}" type="slidenum">
+              <a:rPr lang="en-US" smtClean="0"/>
+              <a:t>14</a:t>
+            </a:fld>
+            <a:endParaRPr lang="en-US" dirty="0"/>
+          </a:p>
+        </p:txBody>
+      </p:sp>
+      <p:sp>
+        <p:nvSpPr>
+          <p:cNvPr id="12" name="Content Placeholder 11">
+            <a:extLst>
+              <a:ext uri="{FF2B5EF4-FFF2-40B4-BE49-F238E27FC236}">
+                <a16:creationId xmlns:a16="http://schemas.microsoft.com/office/drawing/2014/main" id="{CE3C1BFF-2275-1E7D-0604-E6F5CFEC01F6}"/>
+              </a:ext>
+            </a:extLst>
+          </p:cNvPr>
+          <p:cNvSpPr>
+            <a:spLocks noGrp="1"/>
+          </p:cNvSpPr>
+          <p:nvPr>
+            <p:ph sz="half" idx="2"/>
+          </p:nvPr>
+        </p:nvSpPr>
+        <p:spPr>
+          <a:xfrm>
+            <a:off x="3712191" y="1266764"/>
+            <a:ext cx="7874758" cy="4180459"/>
+          </a:xfrm>
+        </p:spPr>
+        <p:txBody>
+          <a:bodyPr/>
+          <a:lstStyle/>
+          <a:p>
+            <a:r>
+              <a:rPr lang="en-US" sz="2400" dirty="0">
+                <a:solidFill>
+                  <a:schemeClr val="accent6">
+                    <a:lumMod val="60000"/>
+                    <a:lumOff val="40000"/>
+                  </a:schemeClr>
+                </a:solidFill>
+              </a:rPr>
+              <a:t>Original Titles: </a:t>
+            </a:r>
+            <a:r>
+              <a:rPr lang="en-US" sz="2000" dirty="0">
+                <a:solidFill>
+                  <a:srgbClr val="0070C0"/>
+                </a:solidFill>
+              </a:rPr>
+              <a:t>Remakes of old films perform better in overall markets. The best choices of film productions should be not be new film but </a:t>
+            </a:r>
+            <a:r>
+              <a:rPr lang="en-US" sz="2000" i="1" dirty="0">
+                <a:solidFill>
+                  <a:srgbClr val="FF0000"/>
+                </a:solidFill>
+              </a:rPr>
+              <a:t>a </a:t>
+            </a:r>
+            <a:r>
+              <a:rPr lang="en-US" sz="2000" dirty="0">
+                <a:solidFill>
+                  <a:srgbClr val="FF0000"/>
+                </a:solidFill>
+              </a:rPr>
+              <a:t>remodeling</a:t>
+            </a:r>
+            <a:r>
+              <a:rPr lang="en-US" sz="2000" i="1" dirty="0">
+                <a:solidFill>
+                  <a:srgbClr val="FF0000"/>
+                </a:solidFill>
+              </a:rPr>
+              <a:t> of old films</a:t>
+            </a:r>
+            <a:r>
+              <a:rPr lang="en-US" sz="2000" dirty="0">
+                <a:solidFill>
+                  <a:srgbClr val="0070C0"/>
+                </a:solidFill>
+              </a:rPr>
+              <a:t>.</a:t>
+            </a:r>
+            <a:endParaRPr lang="en-US" sz="2400" dirty="0">
+              <a:solidFill>
+                <a:schemeClr val="accent6">
+                  <a:lumMod val="60000"/>
+                  <a:lumOff val="40000"/>
+                </a:schemeClr>
+              </a:solidFill>
+            </a:endParaRPr>
+          </a:p>
+          <a:p>
+            <a:endParaRPr lang="en-US" sz="2400" dirty="0">
+              <a:solidFill>
+                <a:schemeClr val="accent6">
+                  <a:lumMod val="60000"/>
+                  <a:lumOff val="40000"/>
+                </a:schemeClr>
+              </a:solidFill>
+            </a:endParaRPr>
+          </a:p>
+          <a:p>
+            <a:r>
+              <a:rPr lang="en-US" sz="2400" dirty="0">
+                <a:solidFill>
+                  <a:schemeClr val="accent6">
+                    <a:lumMod val="60000"/>
+                    <a:lumOff val="40000"/>
+                  </a:schemeClr>
+                </a:solidFill>
+              </a:rPr>
+              <a:t>Genre</a:t>
+            </a:r>
+            <a:r>
+              <a:rPr lang="en-US" sz="2000" dirty="0">
+                <a:solidFill>
+                  <a:srgbClr val="0070C0"/>
+                </a:solidFill>
+              </a:rPr>
+              <a:t>: based upon the analysis we found out that </a:t>
+            </a:r>
+            <a:r>
+              <a:rPr lang="en-US" sz="2000" i="1" dirty="0">
+                <a:solidFill>
+                  <a:srgbClr val="FF0000"/>
+                </a:solidFill>
+              </a:rPr>
+              <a:t>Drama, Action, Fantasy, Music </a:t>
+            </a:r>
+            <a:r>
+              <a:rPr lang="en-US" sz="2000" dirty="0">
+                <a:solidFill>
+                  <a:srgbClr val="0070C0"/>
+                </a:solidFill>
+              </a:rPr>
+              <a:t>and </a:t>
+            </a:r>
+            <a:r>
+              <a:rPr lang="en-US" sz="2000" i="1" dirty="0">
+                <a:solidFill>
+                  <a:srgbClr val="FF0000"/>
+                </a:solidFill>
+              </a:rPr>
+              <a:t>Romance</a:t>
+            </a:r>
+            <a:r>
+              <a:rPr lang="en-US" sz="2000" dirty="0">
+                <a:solidFill>
+                  <a:srgbClr val="0070C0"/>
+                </a:solidFill>
+              </a:rPr>
+              <a:t>. A choice of production of any of this genres would receive a positive reception in the market.</a:t>
+            </a:r>
+          </a:p>
+          <a:p>
+            <a:endParaRPr lang="en-US" sz="2400" dirty="0">
+              <a:solidFill>
+                <a:schemeClr val="accent6">
+                  <a:lumMod val="60000"/>
+                  <a:lumOff val="40000"/>
+                </a:schemeClr>
+              </a:solidFill>
+            </a:endParaRPr>
+          </a:p>
+          <a:p>
+            <a:r>
+              <a:rPr lang="en-US" sz="2400" dirty="0">
+                <a:solidFill>
+                  <a:schemeClr val="accent6">
+                    <a:lumMod val="60000"/>
+                    <a:lumOff val="40000"/>
+                  </a:schemeClr>
+                </a:solidFill>
+              </a:rPr>
+              <a:t>Region</a:t>
+            </a:r>
+            <a:r>
+              <a:rPr lang="en-US" sz="2000" dirty="0">
+                <a:solidFill>
+                  <a:srgbClr val="0070C0"/>
+                </a:solidFill>
+              </a:rPr>
+              <a:t>: The best choice of region to set up a Studio was found to be either in : </a:t>
+            </a:r>
+            <a:r>
+              <a:rPr lang="en-US" sz="2000" i="1" dirty="0">
+                <a:solidFill>
+                  <a:srgbClr val="FF0000"/>
+                </a:solidFill>
+              </a:rPr>
+              <a:t>`US`</a:t>
+            </a:r>
+            <a:r>
+              <a:rPr lang="en-US" sz="2000" dirty="0">
+                <a:solidFill>
+                  <a:srgbClr val="0070C0"/>
+                </a:solidFill>
+              </a:rPr>
+              <a:t>, </a:t>
+            </a:r>
+            <a:r>
+              <a:rPr lang="en-US" sz="2000" i="1" dirty="0">
+                <a:solidFill>
+                  <a:srgbClr val="FF0000"/>
+                </a:solidFill>
+              </a:rPr>
+              <a:t>`XWW` </a:t>
+            </a:r>
+            <a:r>
+              <a:rPr lang="en-US" sz="2000" dirty="0">
+                <a:solidFill>
+                  <a:srgbClr val="0070C0"/>
+                </a:solidFill>
+              </a:rPr>
+              <a:t>or </a:t>
+            </a:r>
+            <a:r>
+              <a:rPr lang="en-US" sz="2000" i="1" dirty="0">
+                <a:solidFill>
+                  <a:srgbClr val="FF0000"/>
+                </a:solidFill>
+              </a:rPr>
+              <a:t>`GB`.</a:t>
+            </a:r>
+          </a:p>
+          <a:p>
+            <a:endParaRPr lang="en-US" sz="2000" dirty="0">
+              <a:solidFill>
+                <a:srgbClr val="0070C0"/>
+              </a:solidFill>
+            </a:endParaRPr>
+          </a:p>
+          <a:p>
+            <a:r>
+              <a:rPr lang="en-US" sz="2400" dirty="0">
+                <a:solidFill>
+                  <a:schemeClr val="accent6">
+                    <a:lumMod val="60000"/>
+                    <a:lumOff val="40000"/>
+                  </a:schemeClr>
+                </a:solidFill>
+              </a:rPr>
+              <a:t>Language</a:t>
+            </a:r>
+            <a:r>
+              <a:rPr lang="en-US" sz="2000" dirty="0">
+                <a:solidFill>
+                  <a:srgbClr val="0070C0"/>
+                </a:solidFill>
+              </a:rPr>
+              <a:t> and </a:t>
+            </a:r>
+            <a:r>
+              <a:rPr lang="en-US" sz="2400" dirty="0">
+                <a:solidFill>
+                  <a:schemeClr val="accent6">
+                    <a:lumMod val="60000"/>
+                    <a:lumOff val="40000"/>
+                  </a:schemeClr>
+                </a:solidFill>
+              </a:rPr>
+              <a:t>Runtime</a:t>
+            </a:r>
+            <a:r>
+              <a:rPr lang="en-US" sz="2000" dirty="0">
+                <a:solidFill>
+                  <a:srgbClr val="0070C0"/>
+                </a:solidFill>
+              </a:rPr>
+              <a:t>: The most occurring languages that performed well were: </a:t>
+            </a:r>
+            <a:r>
+              <a:rPr lang="en-US" sz="2000" dirty="0">
+                <a:solidFill>
+                  <a:srgbClr val="FF0000"/>
+                </a:solidFill>
+              </a:rPr>
+              <a:t>‘English’,  ‘French’,  ‘Thailand’ </a:t>
+            </a:r>
+            <a:r>
+              <a:rPr lang="en-US" sz="2000" dirty="0">
+                <a:solidFill>
+                  <a:srgbClr val="0070C0"/>
+                </a:solidFill>
+              </a:rPr>
+              <a:t>and </a:t>
+            </a:r>
+            <a:r>
+              <a:rPr lang="en-US" sz="2000" dirty="0">
+                <a:solidFill>
+                  <a:srgbClr val="FF0000"/>
+                </a:solidFill>
+              </a:rPr>
+              <a:t>‘Russian’. </a:t>
+            </a:r>
+            <a:r>
+              <a:rPr lang="en-US" sz="2000" dirty="0">
+                <a:solidFill>
+                  <a:srgbClr val="0070C0"/>
+                </a:solidFill>
+              </a:rPr>
+              <a:t>Any choice of these languages recommended for any film production of roughly </a:t>
+            </a:r>
+            <a:r>
+              <a:rPr lang="en-US" sz="2000" dirty="0">
+                <a:solidFill>
+                  <a:srgbClr val="FF0000"/>
+                </a:solidFill>
+              </a:rPr>
+              <a:t>94 minutes </a:t>
+            </a:r>
+            <a:r>
+              <a:rPr lang="en-US" sz="2000" dirty="0">
+                <a:solidFill>
+                  <a:srgbClr val="0070C0"/>
+                </a:solidFill>
+              </a:rPr>
+              <a:t>of runtime length.</a:t>
+            </a:r>
+            <a:endParaRPr lang="en-US" sz="1800" dirty="0"/>
+          </a:p>
+        </p:txBody>
+      </p:sp>
+      <p:pic>
+        <p:nvPicPr>
+          <p:cNvPr id="6" name="Picture 5">
+            <a:extLst>
+              <a:ext uri="{FF2B5EF4-FFF2-40B4-BE49-F238E27FC236}">
+                <a16:creationId xmlns:a16="http://schemas.microsoft.com/office/drawing/2014/main" id="{2F363E5C-3B88-4BB9-1AD1-98C20148F31B}"/>
+              </a:ext>
+            </a:extLst>
+          </p:cNvPr>
+          <p:cNvPicPr>
+            <a:picLocks noChangeAspect="1"/>
+          </p:cNvPicPr>
+          <p:nvPr/>
+        </p:nvPicPr>
+        <p:blipFill>
+          <a:blip r:embed="rId2"/>
+          <a:stretch>
+            <a:fillRect/>
+          </a:stretch>
+        </p:blipFill>
+        <p:spPr>
+          <a:xfrm>
+            <a:off x="-196238" y="274595"/>
+            <a:ext cx="3717361" cy="3474169"/>
+          </a:xfrm>
+          <a:prstGeom prst="rect">
+            <a:avLst/>
+          </a:prstGeom>
+        </p:spPr>
+      </p:pic>
+    </p:spTree>
+    <p:extLst>
+      <p:ext uri="{BB962C8B-B14F-4D97-AF65-F5344CB8AC3E}">
+        <p14:creationId xmlns:p14="http://schemas.microsoft.com/office/powerpoint/2010/main" val="3170280394"/>
+      </p:ext>
+    </p:extLst>
+  </p:cSld>
+  <p:clrMapOvr>
+    <a:masterClrMapping/>
+  </p:clrMapOvr>
+</p:sld>
+</file>
+
+<file path=ppt/slides/slide15.xml><?xml version="1.0" encoding="utf-8"?>
 <p:sld xmlns:a="http://schemas.openxmlformats.org/drawingml/2006/main" xmlns:r="http://schemas.openxmlformats.org/officeDocument/2006/relationships" xmlns:p="http://schemas.openxmlformats.org/presentationml/2006/main">
   <p:cSld>
     <p:spTree>
@@ -23260,7 +25316,7 @@
         </p:nvSpPr>
         <p:spPr>
           <a:xfrm>
-            <a:off x="1065276" y="2069592"/>
+            <a:off x="915150" y="753948"/>
             <a:ext cx="6766560" cy="768096"/>
           </a:xfrm>
         </p:spPr>
@@ -23329,7 +25385,7 @@
             <a:fld id="{48F63A3B-78C7-47BE-AE5E-E10140E04643}" type="slidenum">
               <a:rPr lang="en-US" smtClean="0"/>
               <a:pPr/>
-              <a:t>10</a:t>
+              <a:t>15</a:t>
             </a:fld>
             <a:endParaRPr lang="en-US" dirty="0"/>
           </a:p>
@@ -23353,34 +25409,177 @@
         </p:nvSpPr>
         <p:spPr>
           <a:xfrm>
-            <a:off x="1614777" y="2839411"/>
-            <a:ext cx="5879592" cy="2700528"/>
+            <a:off x="621792" y="942372"/>
+            <a:ext cx="7843122" cy="2700528"/>
           </a:xfrm>
         </p:spPr>
         <p:txBody>
           <a:bodyPr/>
           <a:lstStyle/>
           <a:p>
-            <a:pPr algn="ctr"/>
-            <a:endParaRPr lang="en-US" sz="2000" dirty="0"/>
-          </a:p>
-          <a:p>
-            <a:pPr algn="ctr"/>
-            <a:endParaRPr lang="en-US" sz="2000" dirty="0"/>
-          </a:p>
-          <a:p>
-            <a:pPr algn="ctr"/>
-            <a:r>
-              <a:rPr lang="en-US" sz="2000" dirty="0"/>
-              <a:t>Microsoft Should get into Film Production business.</a:t>
-            </a:r>
-          </a:p>
-          <a:p>
-            <a:pPr algn="ctr"/>
-            <a:endParaRPr lang="en-US" sz="2000" dirty="0"/>
+            <a:endParaRPr lang="en-US" sz="3200" dirty="0"/>
+          </a:p>
+          <a:p>
+            <a:endParaRPr lang="en-US" sz="3200" dirty="0"/>
+          </a:p>
+          <a:p>
+            <a:r>
+              <a:rPr lang="en-US" sz="2800" dirty="0"/>
+              <a:t>Microsoft Should get into Film Production business by setting up studio in </a:t>
+            </a:r>
+          </a:p>
+          <a:p>
+            <a:endParaRPr lang="en-US" sz="2800" dirty="0"/>
+          </a:p>
+          <a:p>
+            <a:r>
+              <a:rPr lang="en-US" sz="2800" dirty="0"/>
+              <a:t>Producing a </a:t>
+            </a:r>
+            <a:r>
+              <a:rPr lang="en-US" sz="2800" dirty="0" err="1">
+                <a:solidFill>
+                  <a:srgbClr val="FF0000"/>
+                </a:solidFill>
+              </a:rPr>
+              <a:t>Remodelling</a:t>
+            </a:r>
+            <a:r>
+              <a:rPr lang="en-US" sz="2800" dirty="0">
+                <a:solidFill>
+                  <a:srgbClr val="FF0000"/>
+                </a:solidFill>
+              </a:rPr>
+              <a:t> of Old Films</a:t>
+            </a:r>
+            <a:r>
+              <a:rPr lang="en-US" sz="2800" dirty="0"/>
+              <a:t>, of the genres: </a:t>
+            </a:r>
+            <a:r>
+              <a:rPr lang="en-US" sz="2800" i="1" dirty="0">
+                <a:solidFill>
+                  <a:srgbClr val="FF0000"/>
+                </a:solidFill>
+              </a:rPr>
+              <a:t>Drama, Action, Fantasy, Music </a:t>
+            </a:r>
+            <a:r>
+              <a:rPr lang="en-US" sz="2800" i="1" dirty="0">
+                <a:solidFill>
+                  <a:srgbClr val="0070C0"/>
+                </a:solidFill>
+              </a:rPr>
+              <a:t>or</a:t>
+            </a:r>
+            <a:r>
+              <a:rPr lang="en-US" sz="2800" dirty="0">
+                <a:solidFill>
+                  <a:srgbClr val="0070C0"/>
+                </a:solidFill>
+              </a:rPr>
+              <a:t> </a:t>
+            </a:r>
+            <a:r>
+              <a:rPr lang="en-US" sz="2800" i="1" dirty="0">
+                <a:solidFill>
+                  <a:srgbClr val="FF0000"/>
+                </a:solidFill>
+              </a:rPr>
+              <a:t>Romance </a:t>
+            </a:r>
+            <a:r>
+              <a:rPr lang="en-US" sz="2800" dirty="0"/>
+              <a:t>composed of either of these </a:t>
+            </a:r>
+            <a:r>
+              <a:rPr lang="en-US" sz="2800" dirty="0" err="1"/>
+              <a:t>langauges</a:t>
+            </a:r>
+            <a:r>
+              <a:rPr lang="en-US" sz="2800" dirty="0"/>
+              <a:t>: </a:t>
+            </a:r>
+            <a:r>
+              <a:rPr lang="en-US" sz="2800" dirty="0">
+                <a:solidFill>
+                  <a:srgbClr val="FF0000"/>
+                </a:solidFill>
+              </a:rPr>
+              <a:t>‘English’,  ‘French’,  ‘Thailand’ </a:t>
+            </a:r>
+            <a:r>
+              <a:rPr lang="en-US" sz="2800" dirty="0"/>
+              <a:t>and</a:t>
+            </a:r>
+            <a:r>
+              <a:rPr lang="en-US" sz="2800" dirty="0">
+                <a:solidFill>
+                  <a:srgbClr val="0070C0"/>
+                </a:solidFill>
+              </a:rPr>
+              <a:t> </a:t>
+            </a:r>
+            <a:r>
+              <a:rPr lang="en-US" sz="2800" dirty="0">
+                <a:solidFill>
+                  <a:srgbClr val="FF0000"/>
+                </a:solidFill>
+              </a:rPr>
+              <a:t>‘Russian’ </a:t>
+            </a:r>
+            <a:r>
+              <a:rPr lang="en-US" sz="2800" dirty="0"/>
+              <a:t>and runtime length of roughly </a:t>
+            </a:r>
+            <a:r>
+              <a:rPr lang="en-US" sz="2800" dirty="0">
+                <a:solidFill>
+                  <a:srgbClr val="FF0000"/>
+                </a:solidFill>
+              </a:rPr>
+              <a:t>94 minutes</a:t>
+            </a:r>
+            <a:r>
+              <a:rPr lang="en-US" sz="2800" dirty="0"/>
+              <a:t>. </a:t>
+            </a:r>
+          </a:p>
+          <a:p>
+            <a:endParaRPr lang="en-US" sz="3200" dirty="0"/>
           </a:p>
         </p:txBody>
       </p:sp>
+      <p:pic>
+        <p:nvPicPr>
+          <p:cNvPr id="7" name="Picture 6">
+            <a:extLst>
+              <a:ext uri="{FF2B5EF4-FFF2-40B4-BE49-F238E27FC236}">
+                <a16:creationId xmlns:a16="http://schemas.microsoft.com/office/drawing/2014/main" id="{F53507FA-45E6-48B6-792B-1C1B3CC453BC}"/>
+              </a:ext>
+            </a:extLst>
+          </p:cNvPr>
+          <p:cNvPicPr>
+            <a:picLocks noChangeAspect="1"/>
+          </p:cNvPicPr>
+          <p:nvPr/>
+        </p:nvPicPr>
+        <p:blipFill>
+          <a:blip r:embed="rId2"/>
+          <a:stretch>
+            <a:fillRect/>
+          </a:stretch>
+        </p:blipFill>
+        <p:spPr>
+          <a:xfrm>
+            <a:off x="7517937" y="1522044"/>
+            <a:ext cx="4225119" cy="4225119"/>
+          </a:xfrm>
+          <a:prstGeom prst="rect">
+            <a:avLst/>
+          </a:prstGeom>
+        </p:spPr>
+      </p:pic>
     </p:spTree>
     <p:extLst>
       <p:ext uri="{BB962C8B-B14F-4D97-AF65-F5344CB8AC3E}">
@@ -23394,7 +25593,7 @@
 </p:sld>
 </file>
 
-<file path=ppt/slides/slide11.xml><?xml version="1.0" encoding="utf-8"?>
+<file path=ppt/slides/slide16.xml><?xml version="1.0" encoding="utf-8"?>
 <p:sld xmlns:a="http://schemas.openxmlformats.org/drawingml/2006/main" xmlns:r="http://schemas.openxmlformats.org/officeDocument/2006/relationships" xmlns:p="http://schemas.openxmlformats.org/presentationml/2006/main">
   <p:cSld>
     <p:spTree>
@@ -23429,7 +25628,7 @@
         </p:nvSpPr>
         <p:spPr>
           <a:xfrm>
-            <a:off x="1195743" y="1862361"/>
+            <a:off x="1195743" y="2587917"/>
             <a:ext cx="5642378" cy="1682165"/>
           </a:xfrm>
         </p:spPr>
@@ -23441,84 +25640,6 @@
             <a:r>
               <a:rPr lang="en-US" dirty="0"/>
               <a:t>THANK YOU</a:t>
-            </a:r>
-          </a:p>
-        </p:txBody>
-      </p:sp>
-      <p:sp>
-        <p:nvSpPr>
-          <p:cNvPr id="6" name="TextBox 5">
-            <a:extLst>
-              <a:ext uri="{FF2B5EF4-FFF2-40B4-BE49-F238E27FC236}">
-                <a16:creationId xmlns:a16="http://schemas.microsoft.com/office/drawing/2014/main" id="{A52CEDF8-203F-FEE6-EA5B-926B373A0F55}"/>
-              </a:ext>
-            </a:extLst>
-          </p:cNvPr>
-          <p:cNvSpPr txBox="1"/>
-          <p:nvPr/>
-        </p:nvSpPr>
-        <p:spPr>
-          <a:xfrm>
-            <a:off x="940904" y="3429000"/>
-            <a:ext cx="6520070" cy="1477328"/>
-          </a:xfrm>
-          <a:prstGeom prst="rect">
-            <a:avLst/>
-          </a:prstGeom>
-          <a:noFill/>
-        </p:spPr>
-        <p:txBody>
-          <a:bodyPr wrap="square" rtlCol="0">
-            <a:spAutoFit/>
-          </a:bodyPr>
-          <a:lstStyle/>
-          <a:p>
-            <a:pPr algn="ctr"/>
-            <a:r>
-              <a:rPr lang="en-US" dirty="0">
-                <a:solidFill>
-                  <a:srgbClr val="FF0000"/>
-                </a:solidFill>
-              </a:rPr>
-              <a:t>Ran out of time, </a:t>
-            </a:r>
-          </a:p>
-          <a:p>
-            <a:pPr algn="ctr"/>
-            <a:endParaRPr lang="en-US" dirty="0">
-              <a:solidFill>
-                <a:srgbClr val="FF0000"/>
-              </a:solidFill>
-            </a:endParaRPr>
-          </a:p>
-          <a:p>
-            <a:pPr algn="ctr"/>
-            <a:r>
-              <a:rPr lang="en-US" dirty="0">
-                <a:solidFill>
-                  <a:srgbClr val="FF0000"/>
-                </a:solidFill>
-              </a:rPr>
-              <a:t>If granted more time I’d have include the visualization.</a:t>
-            </a:r>
-          </a:p>
-          <a:p>
-            <a:pPr algn="ctr"/>
-            <a:endParaRPr lang="en-US" dirty="0">
-              <a:solidFill>
-                <a:srgbClr val="FF0000"/>
-              </a:solidFill>
-            </a:endParaRPr>
-          </a:p>
-          <a:p>
-            <a:pPr algn="ctr"/>
-            <a:r>
-              <a:rPr lang="en-US" dirty="0">
-                <a:solidFill>
-                  <a:srgbClr val="FF0000"/>
-                </a:solidFill>
-              </a:rPr>
-              <a:t>The EDA was fun! </a:t>
             </a:r>
           </a:p>
         </p:txBody>
@@ -23762,6 +25883,7 @@
             <a:endParaRPr lang="en-US" sz="2000" dirty="0"/>
           </a:p>
           <a:p>
+            <a:pPr algn="just"/>
             <a:r>
               <a:rPr lang="en-US" sz="2000" dirty="0"/>
               <a:t>Film production is enormously lucrative venture for any company with a strong brand presence and standing.  Microsoft would indeed have great chance in market penetration, recognition and revenue if it were to partake in this film production domain.</a:t>
@@ -23771,6 +25893,7 @@
             <a:endParaRPr lang="en-US" sz="2000" dirty="0"/>
           </a:p>
           <a:p>
+            <a:pPr algn="just"/>
             <a:r>
               <a:rPr lang="en-US" sz="2000" dirty="0"/>
               <a:t>This study shows us why Microsoft should build a Film Studio and where exactly it should start.</a:t>
@@ -24161,6 +26284,36 @@
           <a:chExt cx="0" cy="0"/>
         </a:xfrm>
       </p:grpSpPr>
+      <p:pic>
+        <p:nvPicPr>
+          <p:cNvPr id="11" name="Picture 10">
+            <a:extLst>
+              <a:ext uri="{FF2B5EF4-FFF2-40B4-BE49-F238E27FC236}">
+                <a16:creationId xmlns:a16="http://schemas.microsoft.com/office/drawing/2014/main" id="{0DCA1668-0703-95C0-A04E-544E253B3DF3}"/>
+              </a:ext>
+            </a:extLst>
+          </p:cNvPr>
+          <p:cNvPicPr>
+            <a:picLocks noChangeAspect="1"/>
+          </p:cNvPicPr>
+          <p:nvPr/>
+        </p:nvPicPr>
+        <p:blipFill>
+          <a:blip r:embed="rId2"/>
+          <a:stretch>
+            <a:fillRect/>
+          </a:stretch>
+        </p:blipFill>
+        <p:spPr>
+          <a:xfrm rot="20493168" flipH="1">
+            <a:off x="-86194" y="2656906"/>
+            <a:ext cx="5165283" cy="5165283"/>
+          </a:xfrm>
+          <a:prstGeom prst="rect">
+            <a:avLst/>
+          </a:prstGeom>
+        </p:spPr>
+      </p:pic>
       <p:sp>
         <p:nvSpPr>
           <p:cNvPr id="2" name="Title 1">
@@ -24179,7 +26332,7 @@
         </p:nvSpPr>
         <p:spPr>
           <a:xfrm>
-            <a:off x="2504661" y="1243584"/>
+            <a:off x="2700130" y="486474"/>
             <a:ext cx="6791739" cy="768096"/>
           </a:xfrm>
         </p:spPr>
@@ -24188,8 +26341,12 @@
           <a:lstStyle/>
           <a:p>
             <a:r>
-              <a:rPr lang="en-US" dirty="0"/>
-              <a:t>questions</a:t>
+              <a:rPr lang="en-US" sz="5400" dirty="0">
+                <a:solidFill>
+                  <a:srgbClr val="002060"/>
+                </a:solidFill>
+              </a:rPr>
+              <a:t>Objectives</a:t>
             </a:r>
           </a:p>
         </p:txBody>
@@ -24212,47 +26369,506 @@
         </p:nvSpPr>
         <p:spPr>
           <a:xfrm>
-            <a:off x="1736035" y="2345635"/>
-            <a:ext cx="8004313" cy="1083365"/>
+            <a:off x="1248670" y="3104248"/>
+            <a:ext cx="8004313" cy="3383624"/>
           </a:xfrm>
         </p:spPr>
         <p:txBody>
           <a:bodyPr/>
           <a:lstStyle/>
           <a:p>
-            <a:r>
-              <a:rPr lang="en-US" dirty="0"/>
-              <a:t>1. How many Titles have been produced in the course of the study</a:t>
-            </a:r>
-          </a:p>
-          <a:p>
-            <a:r>
-              <a:rPr lang="en-US" dirty="0"/>
-              <a:t>2. Are there Original Title? And if there are how many?</a:t>
-            </a:r>
-          </a:p>
-          <a:p>
-            <a:r>
-              <a:rPr lang="en-US" dirty="0"/>
-              <a:t>3. What are the Studios involved in the Film production in the study?</a:t>
-            </a:r>
-          </a:p>
-          <a:p>
-            <a:r>
-              <a:rPr lang="en-US" dirty="0"/>
-              <a:t>4. What Genres have been performing best in both the domestic and worldwide markets?</a:t>
-            </a:r>
-          </a:p>
-          <a:p>
-            <a:r>
-              <a:rPr lang="en-US" dirty="0"/>
-              <a:t>5. What is the Average Length of a performing Film?</a:t>
-            </a:r>
-          </a:p>
-          <a:p>
-            <a:r>
-              <a:rPr lang="en-US" dirty="0"/>
-              <a:t>6. Which Regions and Languages did well in Film Reception?</a:t>
+            <a:pPr algn="r"/>
+            <a:endParaRPr lang="en-US" sz="2000" dirty="0">
+              <a:solidFill>
+                <a:schemeClr val="tx1"/>
+              </a:solidFill>
+            </a:endParaRPr>
+          </a:p>
+          <a:p>
+            <a:pPr algn="r"/>
+            <a:r>
+              <a:rPr lang="en-US" sz="2000" dirty="0">
+                <a:solidFill>
+                  <a:schemeClr val="tx1"/>
+                </a:solidFill>
+              </a:rPr>
+              <a:t>Which Films performed well in domestic and worldwide markets base on: genre, language and region.</a:t>
+            </a:r>
+          </a:p>
+          <a:p>
+            <a:pPr algn="r"/>
+            <a:endParaRPr lang="en-US" sz="2000" dirty="0">
+              <a:solidFill>
+                <a:schemeClr val="tx1"/>
+              </a:solidFill>
+            </a:endParaRPr>
+          </a:p>
+          <a:p>
+            <a:pPr algn="r"/>
+            <a:r>
+              <a:rPr lang="en-US" sz="2000" dirty="0">
+                <a:solidFill>
+                  <a:schemeClr val="tx1"/>
+                </a:solidFill>
+              </a:rPr>
+              <a:t>(i) </a:t>
+            </a:r>
+            <a:r>
+              <a:rPr lang="en-US" sz="2000" dirty="0">
+                <a:solidFill>
+                  <a:srgbClr val="FF0000"/>
+                </a:solidFill>
+              </a:rPr>
+              <a:t>Genre</a:t>
+            </a:r>
+          </a:p>
+          <a:p>
+            <a:pPr algn="r"/>
+            <a:endParaRPr lang="en-US" sz="2000" dirty="0">
+              <a:solidFill>
+                <a:schemeClr val="tx1"/>
+              </a:solidFill>
+            </a:endParaRPr>
+          </a:p>
+          <a:p>
+            <a:pPr algn="r"/>
+            <a:r>
+              <a:rPr lang="en-US" sz="2000" dirty="0">
+                <a:solidFill>
+                  <a:schemeClr val="tx1"/>
+                </a:solidFill>
+              </a:rPr>
+              <a:t>(ii) </a:t>
+            </a:r>
+            <a:r>
+              <a:rPr lang="en-US" sz="2000" dirty="0">
+                <a:solidFill>
+                  <a:srgbClr val="FF0000"/>
+                </a:solidFill>
+              </a:rPr>
+              <a:t>Original titles </a:t>
+            </a:r>
+            <a:r>
+              <a:rPr lang="en-US" sz="2000" dirty="0">
+                <a:solidFill>
+                  <a:schemeClr val="tx1"/>
+                </a:solidFill>
+              </a:rPr>
+              <a:t>perform in the market? </a:t>
+            </a:r>
+          </a:p>
+          <a:p>
+            <a:pPr algn="r"/>
+            <a:endParaRPr lang="en-US" sz="2000" dirty="0">
+              <a:solidFill>
+                <a:schemeClr val="tx1"/>
+              </a:solidFill>
+            </a:endParaRPr>
+          </a:p>
+          <a:p>
+            <a:pPr algn="r"/>
+            <a:r>
+              <a:rPr lang="en-US" sz="2000" dirty="0">
+                <a:solidFill>
+                  <a:schemeClr val="tx1"/>
+                </a:solidFill>
+              </a:rPr>
+              <a:t>(iii) </a:t>
+            </a:r>
+            <a:r>
+              <a:rPr lang="en-US" sz="2000" dirty="0">
+                <a:solidFill>
+                  <a:srgbClr val="FF0000"/>
+                </a:solidFill>
+              </a:rPr>
+              <a:t>Language</a:t>
+            </a:r>
+          </a:p>
+          <a:p>
+            <a:pPr algn="r"/>
+            <a:endParaRPr lang="en-US" sz="2000" dirty="0">
+              <a:solidFill>
+                <a:schemeClr val="tx1"/>
+              </a:solidFill>
+            </a:endParaRPr>
+          </a:p>
+          <a:p>
+            <a:pPr algn="r"/>
+            <a:r>
+              <a:rPr lang="en-US" sz="2000" dirty="0">
+                <a:solidFill>
+                  <a:schemeClr val="tx1"/>
+                </a:solidFill>
+              </a:rPr>
+              <a:t>(iv) </a:t>
+            </a:r>
+            <a:r>
+              <a:rPr lang="en-US" sz="2000" dirty="0">
+                <a:solidFill>
+                  <a:srgbClr val="FF0000"/>
+                </a:solidFill>
+              </a:rPr>
+              <a:t>Region</a:t>
+            </a:r>
+          </a:p>
+        </p:txBody>
+      </p:sp>
+      <p:sp>
+        <p:nvSpPr>
+          <p:cNvPr id="4" name="Text Placeholder 2">
+            <a:extLst>
+              <a:ext uri="{FF2B5EF4-FFF2-40B4-BE49-F238E27FC236}">
+                <a16:creationId xmlns:a16="http://schemas.microsoft.com/office/drawing/2014/main" id="{AB32A0A6-EABC-2CAC-29DC-F70F5FEB0240}"/>
+              </a:ext>
+            </a:extLst>
+          </p:cNvPr>
+          <p:cNvSpPr txBox="1">
+            <a:spLocks/>
+          </p:cNvSpPr>
+          <p:nvPr/>
+        </p:nvSpPr>
+        <p:spPr>
+          <a:xfrm>
+            <a:off x="1761451" y="2011680"/>
+            <a:ext cx="8004313" cy="1083365"/>
+          </a:xfrm>
+          <a:prstGeom prst="rect">
+            <a:avLst/>
+          </a:prstGeom>
+        </p:spPr>
+        <p:txBody>
+          <a:bodyPr vert="horz" lIns="0" tIns="0" rIns="0" bIns="0" rtlCol="0">
+            <a:noAutofit/>
+          </a:bodyPr>
+          <a:lstStyle>
+            <a:lvl1pPr marL="0" indent="0" algn="ctr" defTabSz="914400" rtl="0" eaLnBrk="1" latinLnBrk="0" hangingPunct="1">
+              <a:lnSpc>
+                <a:spcPct val="100000"/>
+              </a:lnSpc>
+              <a:spcBef>
+                <a:spcPts val="0"/>
+              </a:spcBef>
+              <a:buFont typeface="Arial" panose="020B0604020202020204" pitchFamily="34" charset="0"/>
+              <a:buNone/>
+              <a:defRPr sz="2400" kern="1200">
+                <a:solidFill>
+                  <a:schemeClr val="accent6"/>
+                </a:solidFill>
+                <a:latin typeface="+mn-lt"/>
+                <a:ea typeface="+mn-ea"/>
+                <a:cs typeface="+mn-cs"/>
+              </a:defRPr>
+            </a:lvl1pPr>
+            <a:lvl2pPr marL="457200" indent="0" algn="l" defTabSz="914400" rtl="0" eaLnBrk="1" latinLnBrk="0" hangingPunct="1">
+              <a:lnSpc>
+                <a:spcPct val="100000"/>
+              </a:lnSpc>
+              <a:spcBef>
+                <a:spcPts val="360"/>
+              </a:spcBef>
+              <a:buFont typeface="Arial" panose="020B0604020202020204" pitchFamily="34" charset="0"/>
+              <a:buNone/>
+              <a:defRPr sz="2000" kern="1200">
+                <a:solidFill>
+                  <a:schemeClr val="tx1">
+                    <a:tint val="75000"/>
+                  </a:schemeClr>
+                </a:solidFill>
+                <a:latin typeface="+mn-lt"/>
+                <a:ea typeface="+mn-ea"/>
+                <a:cs typeface="+mn-cs"/>
+              </a:defRPr>
+            </a:lvl2pPr>
+            <a:lvl3pPr marL="914400" indent="0" algn="l" defTabSz="914400" rtl="0" eaLnBrk="1" latinLnBrk="0" hangingPunct="1">
+              <a:lnSpc>
+                <a:spcPct val="100000"/>
+              </a:lnSpc>
+              <a:spcBef>
+                <a:spcPts val="360"/>
+              </a:spcBef>
+              <a:buFont typeface="Arial" panose="020B0604020202020204" pitchFamily="34" charset="0"/>
+              <a:buNone/>
+              <a:defRPr sz="1800" kern="1200">
+                <a:solidFill>
+                  <a:schemeClr val="tx1">
+                    <a:tint val="75000"/>
+                  </a:schemeClr>
+                </a:solidFill>
+                <a:latin typeface="+mn-lt"/>
+                <a:ea typeface="+mn-ea"/>
+                <a:cs typeface="+mn-cs"/>
+              </a:defRPr>
+            </a:lvl3pPr>
+            <a:lvl4pPr marL="1371600" indent="0" algn="l" defTabSz="914400" rtl="0" eaLnBrk="1" latinLnBrk="0" hangingPunct="1">
+              <a:lnSpc>
+                <a:spcPct val="100000"/>
+              </a:lnSpc>
+              <a:spcBef>
+                <a:spcPts val="360"/>
+              </a:spcBef>
+              <a:buFont typeface="Arial" panose="020B0604020202020204" pitchFamily="34" charset="0"/>
+              <a:buNone/>
+              <a:defRPr sz="1600" kern="1200">
+                <a:solidFill>
+                  <a:schemeClr val="tx1">
+                    <a:tint val="75000"/>
+                  </a:schemeClr>
+                </a:solidFill>
+                <a:latin typeface="+mn-lt"/>
+                <a:ea typeface="+mn-ea"/>
+                <a:cs typeface="+mn-cs"/>
+              </a:defRPr>
+            </a:lvl4pPr>
+            <a:lvl5pPr marL="1828800" indent="0" algn="l" defTabSz="914400" rtl="0" eaLnBrk="1" latinLnBrk="0" hangingPunct="1">
+              <a:lnSpc>
+                <a:spcPct val="100000"/>
+              </a:lnSpc>
+              <a:spcBef>
+                <a:spcPts val="360"/>
+              </a:spcBef>
+              <a:buFont typeface="Arial" panose="020B0604020202020204" pitchFamily="34" charset="0"/>
+              <a:buNone/>
+              <a:defRPr sz="1600" kern="1200">
+                <a:solidFill>
+                  <a:schemeClr val="tx1">
+                    <a:tint val="75000"/>
+                  </a:schemeClr>
+                </a:solidFill>
+                <a:latin typeface="+mn-lt"/>
+                <a:ea typeface="+mn-ea"/>
+                <a:cs typeface="+mn-cs"/>
+              </a:defRPr>
+            </a:lvl5pPr>
+            <a:lvl6pPr marL="2286000" indent="0" algn="l" defTabSz="914400" rtl="0" eaLnBrk="1" latinLnBrk="0" hangingPunct="1">
+              <a:lnSpc>
+                <a:spcPct val="90000"/>
+              </a:lnSpc>
+              <a:spcBef>
+                <a:spcPts val="500"/>
+              </a:spcBef>
+              <a:buFont typeface="Arial" panose="020B0604020202020204" pitchFamily="34" charset="0"/>
+              <a:buNone/>
+              <a:defRPr sz="1600" kern="1200">
+                <a:solidFill>
+                  <a:schemeClr val="tx1">
+                    <a:tint val="75000"/>
+                  </a:schemeClr>
+                </a:solidFill>
+                <a:latin typeface="+mn-lt"/>
+                <a:ea typeface="+mn-ea"/>
+                <a:cs typeface="+mn-cs"/>
+              </a:defRPr>
+            </a:lvl6pPr>
+            <a:lvl7pPr marL="2743200" indent="0" algn="l" defTabSz="914400" rtl="0" eaLnBrk="1" latinLnBrk="0" hangingPunct="1">
+              <a:lnSpc>
+                <a:spcPct val="90000"/>
+              </a:lnSpc>
+              <a:spcBef>
+                <a:spcPts val="500"/>
+              </a:spcBef>
+              <a:buFont typeface="Arial" panose="020B0604020202020204" pitchFamily="34" charset="0"/>
+              <a:buNone/>
+              <a:defRPr sz="1600" kern="1200">
+                <a:solidFill>
+                  <a:schemeClr val="tx1">
+                    <a:tint val="75000"/>
+                  </a:schemeClr>
+                </a:solidFill>
+                <a:latin typeface="+mn-lt"/>
+                <a:ea typeface="+mn-ea"/>
+                <a:cs typeface="+mn-cs"/>
+              </a:defRPr>
+            </a:lvl7pPr>
+            <a:lvl8pPr marL="3200400" indent="0" algn="l" defTabSz="914400" rtl="0" eaLnBrk="1" latinLnBrk="0" hangingPunct="1">
+              <a:lnSpc>
+                <a:spcPct val="90000"/>
+              </a:lnSpc>
+              <a:spcBef>
+                <a:spcPts val="500"/>
+              </a:spcBef>
+              <a:buFont typeface="Arial" panose="020B0604020202020204" pitchFamily="34" charset="0"/>
+              <a:buNone/>
+              <a:defRPr sz="1600" kern="1200">
+                <a:solidFill>
+                  <a:schemeClr val="tx1">
+                    <a:tint val="75000"/>
+                  </a:schemeClr>
+                </a:solidFill>
+                <a:latin typeface="+mn-lt"/>
+                <a:ea typeface="+mn-ea"/>
+                <a:cs typeface="+mn-cs"/>
+              </a:defRPr>
+            </a:lvl8pPr>
+            <a:lvl9pPr marL="3657600" indent="0" algn="l" defTabSz="914400" rtl="0" eaLnBrk="1" latinLnBrk="0" hangingPunct="1">
+              <a:lnSpc>
+                <a:spcPct val="90000"/>
+              </a:lnSpc>
+              <a:spcBef>
+                <a:spcPts val="500"/>
+              </a:spcBef>
+              <a:buFont typeface="Arial" panose="020B0604020202020204" pitchFamily="34" charset="0"/>
+              <a:buNone/>
+              <a:defRPr sz="1600" kern="1200">
+                <a:solidFill>
+                  <a:schemeClr val="tx1">
+                    <a:tint val="75000"/>
+                  </a:schemeClr>
+                </a:solidFill>
+                <a:latin typeface="+mn-lt"/>
+                <a:ea typeface="+mn-ea"/>
+                <a:cs typeface="+mn-cs"/>
+              </a:defRPr>
+            </a:lvl9pPr>
+          </a:lstStyle>
+          <a:p>
+            <a:endParaRPr lang="en-US" dirty="0"/>
+          </a:p>
+        </p:txBody>
+      </p:sp>
+      <p:sp>
+        <p:nvSpPr>
+          <p:cNvPr id="5" name="TextBox 4">
+            <a:extLst>
+              <a:ext uri="{FF2B5EF4-FFF2-40B4-BE49-F238E27FC236}">
+                <a16:creationId xmlns:a16="http://schemas.microsoft.com/office/drawing/2014/main" id="{40E19966-5D1C-D15B-5B05-19E4CD60BC7E}"/>
+              </a:ext>
+            </a:extLst>
+          </p:cNvPr>
+          <p:cNvSpPr txBox="1"/>
+          <p:nvPr/>
+        </p:nvSpPr>
+        <p:spPr>
+          <a:xfrm>
+            <a:off x="174995" y="1508787"/>
+            <a:ext cx="6114196" cy="461665"/>
+          </a:xfrm>
+          <a:prstGeom prst="rect">
+            <a:avLst/>
+          </a:prstGeom>
+          <a:noFill/>
+        </p:spPr>
+        <p:txBody>
+          <a:bodyPr wrap="square" rtlCol="0">
+            <a:spAutoFit/>
+          </a:bodyPr>
+          <a:lstStyle/>
+          <a:p>
+            <a:pPr algn="ctr"/>
+            <a:r>
+              <a:rPr lang="en-US" sz="2400" b="1" dirty="0">
+                <a:solidFill>
+                  <a:schemeClr val="accent6">
+                    <a:lumMod val="60000"/>
+                    <a:lumOff val="40000"/>
+                  </a:schemeClr>
+                </a:solidFill>
+                <a:latin typeface="+mj-lt"/>
+              </a:rPr>
+              <a:t>GENERAL OBJECTIVE:</a:t>
+            </a:r>
+          </a:p>
+        </p:txBody>
+      </p:sp>
+      <p:sp>
+        <p:nvSpPr>
+          <p:cNvPr id="6" name="TextBox 5">
+            <a:extLst>
+              <a:ext uri="{FF2B5EF4-FFF2-40B4-BE49-F238E27FC236}">
+                <a16:creationId xmlns:a16="http://schemas.microsoft.com/office/drawing/2014/main" id="{59ECC286-3E39-3BB8-B77C-253D6B2EC294}"/>
+              </a:ext>
+            </a:extLst>
+          </p:cNvPr>
+          <p:cNvSpPr txBox="1"/>
+          <p:nvPr/>
+        </p:nvSpPr>
+        <p:spPr>
+          <a:xfrm>
+            <a:off x="229587" y="2855762"/>
+            <a:ext cx="6114196" cy="461665"/>
+          </a:xfrm>
+          <a:prstGeom prst="rect">
+            <a:avLst/>
+          </a:prstGeom>
+          <a:noFill/>
+        </p:spPr>
+        <p:txBody>
+          <a:bodyPr wrap="square" rtlCol="0">
+            <a:spAutoFit/>
+          </a:bodyPr>
+          <a:lstStyle/>
+          <a:p>
+            <a:pPr algn="ctr"/>
+            <a:r>
+              <a:rPr lang="en-US" sz="2400" b="1" dirty="0">
+                <a:solidFill>
+                  <a:schemeClr val="accent6">
+                    <a:lumMod val="60000"/>
+                    <a:lumOff val="40000"/>
+                  </a:schemeClr>
+                </a:solidFill>
+                <a:latin typeface="+mj-lt"/>
+              </a:rPr>
+              <a:t>SPECIFIC OBJECTIVES:</a:t>
+            </a:r>
+          </a:p>
+        </p:txBody>
+      </p:sp>
+      <p:sp>
+        <p:nvSpPr>
+          <p:cNvPr id="7" name="TextBox 6">
+            <a:extLst>
+              <a:ext uri="{FF2B5EF4-FFF2-40B4-BE49-F238E27FC236}">
+                <a16:creationId xmlns:a16="http://schemas.microsoft.com/office/drawing/2014/main" id="{463E6FA5-8880-DB23-7EC5-B5BFEE5EA0DD}"/>
+              </a:ext>
+            </a:extLst>
+          </p:cNvPr>
+          <p:cNvSpPr txBox="1"/>
+          <p:nvPr/>
+        </p:nvSpPr>
+        <p:spPr>
+          <a:xfrm>
+            <a:off x="1323832" y="2011396"/>
+            <a:ext cx="8387340" cy="707886"/>
+          </a:xfrm>
+          <a:prstGeom prst="rect">
+            <a:avLst/>
+          </a:prstGeom>
+          <a:noFill/>
+        </p:spPr>
+        <p:txBody>
+          <a:bodyPr wrap="square" rtlCol="0">
+            <a:spAutoFit/>
+          </a:bodyPr>
+          <a:lstStyle/>
+          <a:p>
+            <a:pPr algn="just"/>
+            <a:r>
+              <a:rPr lang="en-US" sz="2000" b="1" dirty="0"/>
+              <a:t>Does Microsoft need to have a Studio of its own? </a:t>
+            </a:r>
+            <a:r>
+              <a:rPr lang="en-US" sz="2000" b="1" dirty="0">
+                <a:solidFill>
+                  <a:srgbClr val="FF0000"/>
+                </a:solidFill>
+              </a:rPr>
+              <a:t>Where </a:t>
+            </a:r>
+            <a:r>
+              <a:rPr lang="en-US" sz="2000" b="1" dirty="0"/>
+              <a:t>and </a:t>
+            </a:r>
+            <a:r>
+              <a:rPr lang="en-US" sz="2000" b="1" dirty="0">
+                <a:solidFill>
+                  <a:srgbClr val="FF0000"/>
+                </a:solidFill>
+              </a:rPr>
+              <a:t>how</a:t>
+            </a:r>
+            <a:r>
+              <a:rPr lang="en-US" sz="2000" b="1" dirty="0"/>
+              <a:t> should it commence its efforts in the industry?</a:t>
             </a:r>
           </a:p>
         </p:txBody>
@@ -24305,7 +26921,7 @@
         </p:nvSpPr>
         <p:spPr>
           <a:xfrm>
-            <a:off x="755904" y="1693230"/>
+            <a:off x="621792" y="210312"/>
             <a:ext cx="10671048" cy="768096"/>
           </a:xfrm>
         </p:spPr>
@@ -24313,6 +26929,16 @@
           <a:bodyPr/>
           <a:lstStyle/>
           <a:p>
+            <a:r>
+              <a:rPr lang="en-US" altLang="zh-CN" sz="4400" b="1" i="1" dirty="0">
+                <a:solidFill>
+                  <a:schemeClr val="tx1"/>
+                </a:solidFill>
+                <a:latin typeface="Arial Black" panose="020B0604020202020204" pitchFamily="34" charset="0"/>
+                <a:cs typeface="Arial Black" panose="020B0604020202020204" pitchFamily="34" charset="0"/>
+              </a:rPr>
+              <a:t>EDA</a:t>
+            </a:r>
             <a:r>
               <a:rPr lang="en-US" altLang="zh-CN" sz="4400" b="1" dirty="0">
                 <a:solidFill>
@@ -24321,44 +26947,25 @@
                 <a:latin typeface="Arial Black" panose="020B0604020202020204" pitchFamily="34" charset="0"/>
                 <a:cs typeface="Arial Black" panose="020B0604020202020204" pitchFamily="34" charset="0"/>
               </a:rPr>
-              <a:t>Basic EDA</a:t>
+              <a:t> and </a:t>
+            </a:r>
+            <a:r>
+              <a:rPr lang="en-US" altLang="zh-CN" sz="4400" b="1" dirty="0">
+                <a:solidFill>
+                  <a:schemeClr val="tx1"/>
+                </a:solidFill>
+                <a:latin typeface="Arial Black" panose="020B0604020202020204" pitchFamily="34" charset="0"/>
+                <a:cs typeface="Arial Black" panose="020B0604020202020204" pitchFamily="34" charset="0"/>
+              </a:rPr>
+              <a:t>data cleaning</a:t>
             </a:r>
             <a:endParaRPr lang="en-US" sz="4400" b="1" dirty="0">
               <a:solidFill>
-                <a:schemeClr val="accent6"/>
+                <a:schemeClr val="tx1"/>
               </a:solidFill>
               <a:latin typeface="Arial Black" panose="020B0604020202020204" pitchFamily="34" charset="0"/>
               <a:cs typeface="Arial Black" panose="020B0604020202020204" pitchFamily="34" charset="0"/>
             </a:endParaRPr>
-          </a:p>
-        </p:txBody>
-      </p:sp>
-      <p:sp>
-        <p:nvSpPr>
-          <p:cNvPr id="7" name="Footer Placeholder 6">
-            <a:extLst>
-              <a:ext uri="{FF2B5EF4-FFF2-40B4-BE49-F238E27FC236}">
-                <a16:creationId xmlns:a16="http://schemas.microsoft.com/office/drawing/2014/main" id="{3A122237-B06F-5E42-B051-D7859FC21D7D}"/>
-              </a:ext>
-            </a:extLst>
-          </p:cNvPr>
-          <p:cNvSpPr>
-            <a:spLocks noGrp="1"/>
-          </p:cNvSpPr>
-          <p:nvPr>
-            <p:ph type="ftr" sz="quarter" idx="11"/>
-          </p:nvPr>
-        </p:nvSpPr>
-        <p:spPr/>
-        <p:txBody>
-          <a:bodyPr/>
-          <a:lstStyle/>
-          <a:p>
-            <a:r>
-              <a:rPr lang="en-US"/>
-              <a:t>Presentation title</a:t>
-            </a:r>
-            <a:endParaRPr lang="en-US" dirty="0"/>
           </a:p>
         </p:txBody>
       </p:sp>
@@ -24407,7 +27014,12 @@
             <p:ph sz="half" idx="1"/>
           </p:nvPr>
         </p:nvSpPr>
-        <p:spPr/>
+        <p:spPr>
+          <a:xfrm>
+            <a:off x="755904" y="945517"/>
+            <a:ext cx="5071690" cy="2483483"/>
+          </a:xfrm>
+        </p:spPr>
         <p:txBody>
           <a:bodyPr/>
           <a:lstStyle/>
@@ -24467,34 +27079,171 @@
             </a:r>
           </a:p>
           <a:p>
-            <a:pPr marL="514350" indent="-514350" algn="ctr">
+            <a:pPr marL="0" indent="0">
+              <a:buNone/>
+            </a:pPr>
+            <a:endParaRPr lang="en-US" sz="2000" dirty="0"/>
+          </a:p>
+          <a:p>
+            <a:pPr marL="0" indent="0">
+              <a:buNone/>
+            </a:pPr>
+            <a:r>
+              <a:rPr lang="en-US" sz="2000" dirty="0"/>
+              <a:t>If we were to suggest the best way to approach launching The Microsoft Studio it would best to check: -</a:t>
+            </a:r>
+          </a:p>
+          <a:p>
+            <a:pPr marL="514350" indent="-514350">
               <a:buAutoNum type="romanLcParenBoth"/>
             </a:pPr>
             <a:r>
               <a:rPr lang="en-US" sz="2000" dirty="0"/>
-              <a:t>At studio have a satellite branch across various regions</a:t>
-            </a:r>
-          </a:p>
-          <a:p>
-            <a:pPr marL="514350" indent="-514350" algn="ctr">
+              <a:t>To choose a more recent and fitting timeline for inspection.</a:t>
+            </a:r>
+          </a:p>
+          <a:p>
+            <a:pPr marL="514350" indent="-514350">
               <a:buAutoNum type="romanLcParenBoth"/>
             </a:pPr>
             <a:r>
               <a:rPr lang="en-US" sz="2000" dirty="0"/>
-              <a:t>There is no shorted the need for a Studio which produced a variety of genres</a:t>
-            </a:r>
-          </a:p>
-          <a:p>
-            <a:pPr marL="514350" indent="-514350" algn="ctr">
+              <a:t>Which Film genres performed well in </a:t>
+            </a:r>
+            <a:r>
+              <a:rPr lang="en-US" sz="2000" dirty="0" err="1"/>
+              <a:t>BoxOffice</a:t>
+            </a:r>
+            <a:r>
+              <a:rPr lang="en-US" sz="2000" dirty="0"/>
+              <a:t> (markets)</a:t>
+            </a:r>
+          </a:p>
+          <a:p>
+            <a:pPr marL="514350" indent="-514350">
               <a:buAutoNum type="romanLcParenBoth"/>
             </a:pPr>
             <a:r>
               <a:rPr lang="en-US" sz="2000" dirty="0"/>
-              <a:t>Studio Revenue from films follows the a particular genre of films</a:t>
+              <a:t>Which Language performed well</a:t>
             </a:r>
           </a:p>
         </p:txBody>
       </p:sp>
+      <p:sp>
+        <p:nvSpPr>
+          <p:cNvPr id="5" name="TextBox 4">
+            <a:extLst>
+              <a:ext uri="{FF2B5EF4-FFF2-40B4-BE49-F238E27FC236}">
+                <a16:creationId xmlns:a16="http://schemas.microsoft.com/office/drawing/2014/main" id="{113BDEE8-3408-987D-AEED-E103D2DCEC80}"/>
+              </a:ext>
+            </a:extLst>
+          </p:cNvPr>
+          <p:cNvSpPr txBox="1"/>
+          <p:nvPr/>
+        </p:nvSpPr>
+        <p:spPr>
+          <a:xfrm>
+            <a:off x="6159694" y="978408"/>
+            <a:ext cx="5249700" cy="2308324"/>
+          </a:xfrm>
+          <a:prstGeom prst="rect">
+            <a:avLst/>
+          </a:prstGeom>
+          <a:noFill/>
+        </p:spPr>
+        <p:txBody>
+          <a:bodyPr wrap="square" rtlCol="0">
+            <a:spAutoFit/>
+          </a:bodyPr>
+          <a:lstStyle/>
+          <a:p>
+            <a:r>
+              <a:rPr lang="en-US" dirty="0">
+                <a:solidFill>
+                  <a:srgbClr val="002060"/>
+                </a:solidFill>
+              </a:rPr>
+              <a:t>(iv) Whether or not original film had a good performance in market.</a:t>
+            </a:r>
+          </a:p>
+          <a:p>
+            <a:endParaRPr lang="en-US" dirty="0">
+              <a:solidFill>
+                <a:srgbClr val="002060"/>
+              </a:solidFill>
+            </a:endParaRPr>
+          </a:p>
+          <a:p>
+            <a:r>
+              <a:rPr lang="en-US" dirty="0">
+                <a:solidFill>
+                  <a:srgbClr val="002060"/>
+                </a:solidFill>
+              </a:rPr>
+              <a:t>(v) Which regions performed well</a:t>
+            </a:r>
+          </a:p>
+          <a:p>
+            <a:endParaRPr lang="en-US" dirty="0">
+              <a:solidFill>
+                <a:srgbClr val="002060"/>
+              </a:solidFill>
+            </a:endParaRPr>
+          </a:p>
+          <a:p>
+            <a:endParaRPr lang="en-US" dirty="0">
+              <a:solidFill>
+                <a:srgbClr val="002060"/>
+              </a:solidFill>
+            </a:endParaRPr>
+          </a:p>
+          <a:p>
+            <a:endParaRPr lang="en-US" dirty="0">
+              <a:solidFill>
+                <a:srgbClr val="002060"/>
+              </a:solidFill>
+            </a:endParaRPr>
+          </a:p>
+          <a:p>
+            <a:endParaRPr lang="en-US" dirty="0">
+              <a:solidFill>
+                <a:srgbClr val="002060"/>
+              </a:solidFill>
+            </a:endParaRPr>
+          </a:p>
+        </p:txBody>
+      </p:sp>
+      <p:pic>
+        <p:nvPicPr>
+          <p:cNvPr id="9" name="Picture 8">
+            <a:extLst>
+              <a:ext uri="{FF2B5EF4-FFF2-40B4-BE49-F238E27FC236}">
+                <a16:creationId xmlns:a16="http://schemas.microsoft.com/office/drawing/2014/main" id="{058BF7A8-23BD-E100-4D7D-9BCD4626583F}"/>
+              </a:ext>
+            </a:extLst>
+          </p:cNvPr>
+          <p:cNvPicPr>
+            <a:picLocks noChangeAspect="1"/>
+          </p:cNvPicPr>
+          <p:nvPr/>
+        </p:nvPicPr>
+        <p:blipFill>
+          <a:blip r:embed="rId2"/>
+          <a:stretch>
+            <a:fillRect/>
+          </a:stretch>
+        </p:blipFill>
+        <p:spPr>
+          <a:xfrm>
+            <a:off x="6559296" y="2261616"/>
+            <a:ext cx="4386072" cy="4386072"/>
+          </a:xfrm>
+          <a:prstGeom prst="rect">
+            <a:avLst/>
+          </a:prstGeom>
+        </p:spPr>
+      </p:pic>
     </p:spTree>
     <p:extLst>
       <p:ext uri="{BB962C8B-B14F-4D97-AF65-F5344CB8AC3E}">
@@ -24525,6 +27274,35 @@
           <a:chExt cx="0" cy="0"/>
         </a:xfrm>
       </p:grpSpPr>
+      <p:pic>
+        <p:nvPicPr>
+          <p:cNvPr id="15" name="Picture 14">
+            <a:extLst>
+              <a:ext uri="{FF2B5EF4-FFF2-40B4-BE49-F238E27FC236}">
+                <a16:creationId xmlns:a16="http://schemas.microsoft.com/office/drawing/2014/main" id="{5CF3BB92-2583-37E7-6728-87C7752BFAA6}"/>
+              </a:ext>
+            </a:extLst>
+          </p:cNvPr>
+          <p:cNvPicPr>
+            <a:picLocks noChangeAspect="1"/>
+          </p:cNvPicPr>
+          <p:nvPr/>
+        </p:nvPicPr>
+        <p:blipFill rotWithShape="1">
+          <a:blip r:embed="rId2"/>
+          <a:srcRect/>
+          <a:stretch/>
+        </p:blipFill>
+        <p:spPr>
+          <a:xfrm>
+            <a:off x="6646212" y="1723372"/>
+            <a:ext cx="5434217" cy="4932451"/>
+          </a:xfrm>
+          <a:prstGeom prst="rect">
+            <a:avLst/>
+          </a:prstGeom>
+        </p:spPr>
+      </p:pic>
       <p:sp>
         <p:nvSpPr>
           <p:cNvPr id="2" name="Title 1">
@@ -24543,17 +27321,18 @@
         </p:nvSpPr>
         <p:spPr>
           <a:xfrm>
-            <a:off x="3685032" y="1243584"/>
-            <a:ext cx="8183880" cy="768096"/>
+            <a:off x="609233" y="289924"/>
+            <a:ext cx="10920984" cy="768096"/>
           </a:xfrm>
         </p:spPr>
         <p:txBody>
           <a:bodyPr/>
           <a:lstStyle/>
           <a:p>
+            <a:pPr algn="ctr"/>
             <a:r>
               <a:rPr lang="en-US" dirty="0"/>
-              <a:t>What we have learnt</a:t>
+              <a:t>Here is what we found out</a:t>
             </a:r>
           </a:p>
         </p:txBody>
@@ -24576,29 +27355,41 @@
         </p:nvSpPr>
         <p:spPr>
           <a:xfrm>
-            <a:off x="3685032" y="2877312"/>
-            <a:ext cx="3741928" cy="3684587"/>
+            <a:off x="1924470" y="1141986"/>
+            <a:ext cx="4751331" cy="3368125"/>
           </a:xfrm>
         </p:spPr>
         <p:txBody>
           <a:bodyPr/>
           <a:lstStyle/>
           <a:p>
-            <a:r>
-              <a:rPr lang="en-US" sz="2000" dirty="0"/>
-              <a:t>There were over 107,459 unique films produced over the period of study.</a:t>
-            </a:r>
-          </a:p>
-          <a:p>
             <a:pPr marL="0" indent="0">
               <a:buNone/>
             </a:pPr>
+            <a:r>
+              <a:rPr lang="en-US" sz="2000" dirty="0"/>
+              <a:t>In Data Cleaning, we had</a:t>
+            </a:r>
+          </a:p>
+          <a:p>
             <a:endParaRPr lang="en-US" sz="2000" dirty="0"/>
           </a:p>
           <a:p>
             <a:r>
               <a:rPr lang="en-US" sz="2000" dirty="0"/>
-              <a:t>None Original films, or remakes of older films, out did originally produced film.</a:t>
+              <a:t>Over 287, 000 films produced over the period of study and we worked on a robust 19,035 film we a labyrinth workable information.</a:t>
+            </a:r>
+          </a:p>
+          <a:p>
+            <a:r>
+              <a:rPr lang="en-US" sz="2000" dirty="0"/>
+              <a:t>There were Original films, or remakes of older films production of films. There number of Remade Films; See figure 1</a:t>
+            </a:r>
+          </a:p>
+          <a:p>
+            <a:r>
+              <a:rPr lang="en-US" sz="2000" dirty="0"/>
+              <a:t>The study encompassed production of film for 10 years; from 2010 to 2020.</a:t>
             </a:r>
           </a:p>
           <a:p>
@@ -24607,41 +27398,11 @@
           <a:p>
             <a:endParaRPr lang="en-US" sz="2000" dirty="0"/>
           </a:p>
-        </p:txBody>
-      </p:sp>
-      <p:sp>
-        <p:nvSpPr>
-          <p:cNvPr id="5" name="Text Placeholder 4">
-            <a:extLst>
-              <a:ext uri="{FF2B5EF4-FFF2-40B4-BE49-F238E27FC236}">
-                <a16:creationId xmlns:a16="http://schemas.microsoft.com/office/drawing/2014/main" id="{36CBD808-483E-4AFC-D713-B2C18968C95D}"/>
-              </a:ext>
-            </a:extLst>
-          </p:cNvPr>
-          <p:cNvSpPr>
-            <a:spLocks noGrp="1"/>
-          </p:cNvSpPr>
-          <p:nvPr>
-            <p:ph type="body" sz="quarter" idx="3"/>
-          </p:nvPr>
-        </p:nvSpPr>
-        <p:spPr>
-          <a:xfrm>
-            <a:off x="7754112" y="2569751"/>
-            <a:ext cx="3822192" cy="411480"/>
-          </a:xfrm>
-        </p:spPr>
-        <p:txBody>
-          <a:bodyPr/>
-          <a:lstStyle/>
-          <a:p>
-            <a:pPr algn="ctr"/>
-            <a:r>
-              <a:rPr lang="en-US" b="0" dirty="0">
-                <a:latin typeface="+mj-lt"/>
-              </a:rPr>
-              <a:t>Also</a:t>
-            </a:r>
+          <a:p>
+            <a:endParaRPr lang="en-US" sz="2000" dirty="0"/>
+          </a:p>
+          <a:p>
+            <a:endParaRPr lang="en-US" sz="2000" dirty="0"/>
           </a:p>
         </p:txBody>
       </p:sp>
@@ -24663,35 +27424,27 @@
         </p:nvSpPr>
         <p:spPr>
           <a:xfrm>
-            <a:off x="7776972" y="3059179"/>
-            <a:ext cx="3741928" cy="3368125"/>
+            <a:off x="6987655" y="1173625"/>
+            <a:ext cx="4751332" cy="1099495"/>
           </a:xfrm>
         </p:spPr>
         <p:txBody>
           <a:bodyPr/>
           <a:lstStyle/>
           <a:p>
-            <a:r>
-              <a:rPr lang="en-US" sz="2000" dirty="0"/>
-              <a:t>The best performing Studios were clustered in either the US, CA or the UK.</a:t>
-            </a:r>
-          </a:p>
-          <a:p>
-            <a:endParaRPr lang="en-US" sz="2000" dirty="0"/>
-          </a:p>
-          <a:p>
-            <a:r>
-              <a:rPr lang="en-US" sz="2000" dirty="0"/>
-              <a:t>And the best performing genres did well if they were Action, Adventure or Sci-Fi.</a:t>
-            </a:r>
-          </a:p>
-          <a:p>
-            <a:endParaRPr lang="en-US" sz="2000" dirty="0"/>
-          </a:p>
-          <a:p>
-            <a:r>
-              <a:rPr lang="en-US" sz="2000" dirty="0"/>
-              <a:t>The Average length of a performing Film was 97 minutes.</a:t>
+            <a:pPr marL="0" indent="0">
+              <a:buNone/>
+            </a:pPr>
+            <a:r>
+              <a:rPr lang="en-US" sz="4400" dirty="0">
+                <a:solidFill>
+                  <a:schemeClr val="accent1">
+                    <a:lumMod val="50000"/>
+                  </a:schemeClr>
+                </a:solidFill>
+                <a:latin typeface="Arial Black (heading)"/>
+              </a:rPr>
+              <a:t>Original Titles</a:t>
             </a:r>
           </a:p>
         </p:txBody>
@@ -24727,202 +27480,74 @@
       </p:sp>
       <p:sp>
         <p:nvSpPr>
-          <p:cNvPr id="9" name="Text Placeholder 4">
+          <p:cNvPr id="16" name="TextBox 15">
             <a:extLst>
               <a:ext uri="{FF2B5EF4-FFF2-40B4-BE49-F238E27FC236}">
-                <a16:creationId xmlns:a16="http://schemas.microsoft.com/office/drawing/2014/main" id="{3FD579EA-3762-09C2-3F5C-D147F60E4092}"/>
+                <a16:creationId xmlns:a16="http://schemas.microsoft.com/office/drawing/2014/main" id="{CF2EBAEF-C1BD-EE6F-961F-ED7A3D368F4B}"/>
               </a:ext>
             </a:extLst>
           </p:cNvPr>
-          <p:cNvSpPr txBox="1">
-            <a:spLocks/>
-          </p:cNvSpPr>
+          <p:cNvSpPr txBox="1"/>
           <p:nvPr/>
         </p:nvSpPr>
         <p:spPr>
           <a:xfrm>
-            <a:off x="3759708" y="2238756"/>
-            <a:ext cx="3822192" cy="411480"/>
+            <a:off x="5861714" y="5716014"/>
+            <a:ext cx="2251881" cy="369332"/>
           </a:xfrm>
           <a:prstGeom prst="rect">
             <a:avLst/>
           </a:prstGeom>
+          <a:noFill/>
         </p:spPr>
         <p:txBody>
-          <a:bodyPr vert="horz" lIns="91440" tIns="45720" rIns="91440" bIns="45720" rtlCol="0" anchor="t">
-            <a:noAutofit/>
+          <a:bodyPr wrap="square" rtlCol="0">
+            <a:spAutoFit/>
           </a:bodyPr>
-          <a:lstStyle>
-            <a:lvl1pPr marL="0" indent="0" algn="l" defTabSz="914400" rtl="0" eaLnBrk="1" latinLnBrk="0" hangingPunct="1">
-              <a:lnSpc>
-                <a:spcPct val="100000"/>
-              </a:lnSpc>
-              <a:spcBef>
-                <a:spcPts val="0"/>
-              </a:spcBef>
-              <a:buFont typeface="Arial" panose="020B0604020202020204" pitchFamily="34" charset="0"/>
-              <a:buNone/>
-              <a:defRPr sz="1800" b="1" kern="1200" cap="all" baseline="0">
+          <a:lstStyle/>
+          <a:p>
+            <a:r>
+              <a:rPr lang="en-US" b="1" dirty="0"/>
+              <a:t>Figure 1</a:t>
+            </a:r>
+          </a:p>
+        </p:txBody>
+      </p:sp>
+      <p:sp>
+        <p:nvSpPr>
+          <p:cNvPr id="17" name="TextBox 16">
+            <a:extLst>
+              <a:ext uri="{FF2B5EF4-FFF2-40B4-BE49-F238E27FC236}">
+                <a16:creationId xmlns:a16="http://schemas.microsoft.com/office/drawing/2014/main" id="{0EE4B59D-AB95-975D-CE80-05313A07FE7D}"/>
+              </a:ext>
+            </a:extLst>
+          </p:cNvPr>
+          <p:cNvSpPr txBox="1"/>
+          <p:nvPr/>
+        </p:nvSpPr>
+        <p:spPr>
+          <a:xfrm>
+            <a:off x="1617259" y="5828437"/>
+            <a:ext cx="4039737" cy="646331"/>
+          </a:xfrm>
+          <a:prstGeom prst="rect">
+            <a:avLst/>
+          </a:prstGeom>
+          <a:noFill/>
+        </p:spPr>
+        <p:txBody>
+          <a:bodyPr wrap="square" rtlCol="0">
+            <a:spAutoFit/>
+          </a:bodyPr>
+          <a:lstStyle/>
+          <a:p>
+            <a:r>
+              <a:rPr lang="en-US" dirty="0">
                 <a:solidFill>
-                  <a:schemeClr val="accent6"/>
+                  <a:srgbClr val="FF0000"/>
                 </a:solidFill>
-                <a:latin typeface="Arial" panose="020B0604020202020204" pitchFamily="34" charset="0"/>
-                <a:ea typeface="+mn-ea"/>
-                <a:cs typeface="Arial" panose="020B0604020202020204" pitchFamily="34" charset="0"/>
-              </a:defRPr>
-            </a:lvl1pPr>
-            <a:lvl2pPr marL="457200" indent="0" algn="l" defTabSz="914400" rtl="0" eaLnBrk="1" latinLnBrk="0" hangingPunct="1">
-              <a:lnSpc>
-                <a:spcPct val="100000"/>
-              </a:lnSpc>
-              <a:spcBef>
-                <a:spcPts val="360"/>
-              </a:spcBef>
-              <a:buFont typeface="Arial" panose="020B0604020202020204" pitchFamily="34" charset="0"/>
-              <a:buNone/>
-              <a:defRPr sz="2000" b="1" kern="1200">
-                <a:solidFill>
-                  <a:schemeClr val="accent6"/>
-                </a:solidFill>
-                <a:latin typeface="+mn-lt"/>
-                <a:ea typeface="+mn-ea"/>
-                <a:cs typeface="+mn-cs"/>
-              </a:defRPr>
-            </a:lvl2pPr>
-            <a:lvl3pPr marL="914400" indent="0" algn="l" defTabSz="914400" rtl="0" eaLnBrk="1" latinLnBrk="0" hangingPunct="1">
-              <a:lnSpc>
-                <a:spcPct val="100000"/>
-              </a:lnSpc>
-              <a:spcBef>
-                <a:spcPts val="360"/>
-              </a:spcBef>
-              <a:buFont typeface="Arial" panose="020B0604020202020204" pitchFamily="34" charset="0"/>
-              <a:buNone/>
-              <a:defRPr sz="1800" b="1" kern="1200">
-                <a:solidFill>
-                  <a:schemeClr val="accent6"/>
-                </a:solidFill>
-                <a:latin typeface="+mn-lt"/>
-                <a:ea typeface="+mn-ea"/>
-                <a:cs typeface="+mn-cs"/>
-              </a:defRPr>
-            </a:lvl3pPr>
-            <a:lvl4pPr marL="1371600" indent="0" algn="l" defTabSz="914400" rtl="0" eaLnBrk="1" latinLnBrk="0" hangingPunct="1">
-              <a:lnSpc>
-                <a:spcPct val="100000"/>
-              </a:lnSpc>
-              <a:spcBef>
-                <a:spcPts val="360"/>
-              </a:spcBef>
-              <a:buFont typeface="Arial" panose="020B0604020202020204" pitchFamily="34" charset="0"/>
-              <a:buNone/>
-              <a:defRPr sz="1600" b="1" kern="1200">
-                <a:solidFill>
-                  <a:schemeClr val="accent6"/>
-                </a:solidFill>
-                <a:latin typeface="+mn-lt"/>
-                <a:ea typeface="+mn-ea"/>
-                <a:cs typeface="+mn-cs"/>
-              </a:defRPr>
-            </a:lvl4pPr>
-            <a:lvl5pPr marL="1828800" indent="0" algn="l" defTabSz="914400" rtl="0" eaLnBrk="1" latinLnBrk="0" hangingPunct="1">
-              <a:lnSpc>
-                <a:spcPct val="100000"/>
-              </a:lnSpc>
-              <a:spcBef>
-                <a:spcPts val="360"/>
-              </a:spcBef>
-              <a:buFont typeface="Arial" panose="020B0604020202020204" pitchFamily="34" charset="0"/>
-              <a:buNone/>
-              <a:defRPr sz="1600" b="1" kern="1200">
-                <a:solidFill>
-                  <a:schemeClr val="accent6"/>
-                </a:solidFill>
-                <a:latin typeface="+mn-lt"/>
-                <a:ea typeface="+mn-ea"/>
-                <a:cs typeface="+mn-cs"/>
-              </a:defRPr>
-            </a:lvl5pPr>
-            <a:lvl6pPr marL="2286000" indent="0" algn="l" defTabSz="914400" rtl="0" eaLnBrk="1" latinLnBrk="0" hangingPunct="1">
-              <a:lnSpc>
-                <a:spcPct val="90000"/>
-              </a:lnSpc>
-              <a:spcBef>
-                <a:spcPts val="500"/>
-              </a:spcBef>
-              <a:buFont typeface="Arial" panose="020B0604020202020204" pitchFamily="34" charset="0"/>
-              <a:buNone/>
-              <a:defRPr sz="1600" b="1" kern="1200">
-                <a:solidFill>
-                  <a:schemeClr val="tx1"/>
-                </a:solidFill>
-                <a:latin typeface="+mn-lt"/>
-                <a:ea typeface="+mn-ea"/>
-                <a:cs typeface="+mn-cs"/>
-              </a:defRPr>
-            </a:lvl6pPr>
-            <a:lvl7pPr marL="2743200" indent="0" algn="l" defTabSz="914400" rtl="0" eaLnBrk="1" latinLnBrk="0" hangingPunct="1">
-              <a:lnSpc>
-                <a:spcPct val="90000"/>
-              </a:lnSpc>
-              <a:spcBef>
-                <a:spcPts val="500"/>
-              </a:spcBef>
-              <a:buFont typeface="Arial" panose="020B0604020202020204" pitchFamily="34" charset="0"/>
-              <a:buNone/>
-              <a:defRPr sz="1600" b="1" kern="1200">
-                <a:solidFill>
-                  <a:schemeClr val="tx1"/>
-                </a:solidFill>
-                <a:latin typeface="+mn-lt"/>
-                <a:ea typeface="+mn-ea"/>
-                <a:cs typeface="+mn-cs"/>
-              </a:defRPr>
-            </a:lvl7pPr>
-            <a:lvl8pPr marL="3200400" indent="0" algn="l" defTabSz="914400" rtl="0" eaLnBrk="1" latinLnBrk="0" hangingPunct="1">
-              <a:lnSpc>
-                <a:spcPct val="90000"/>
-              </a:lnSpc>
-              <a:spcBef>
-                <a:spcPts val="500"/>
-              </a:spcBef>
-              <a:buFont typeface="Arial" panose="020B0604020202020204" pitchFamily="34" charset="0"/>
-              <a:buNone/>
-              <a:defRPr sz="1600" b="1" kern="1200">
-                <a:solidFill>
-                  <a:schemeClr val="tx1"/>
-                </a:solidFill>
-                <a:latin typeface="+mn-lt"/>
-                <a:ea typeface="+mn-ea"/>
-                <a:cs typeface="+mn-cs"/>
-              </a:defRPr>
-            </a:lvl8pPr>
-            <a:lvl9pPr marL="3657600" indent="0" algn="l" defTabSz="914400" rtl="0" eaLnBrk="1" latinLnBrk="0" hangingPunct="1">
-              <a:lnSpc>
-                <a:spcPct val="90000"/>
-              </a:lnSpc>
-              <a:spcBef>
-                <a:spcPts val="500"/>
-              </a:spcBef>
-              <a:buFont typeface="Arial" panose="020B0604020202020204" pitchFamily="34" charset="0"/>
-              <a:buNone/>
-              <a:defRPr sz="1600" b="1" kern="1200">
-                <a:solidFill>
-                  <a:schemeClr val="tx1"/>
-                </a:solidFill>
-                <a:latin typeface="+mn-lt"/>
-                <a:ea typeface="+mn-ea"/>
-                <a:cs typeface="+mn-cs"/>
-              </a:defRPr>
-            </a:lvl9pPr>
-          </a:lstStyle>
-          <a:p>
-            <a:pPr algn="ctr"/>
-            <a:r>
-              <a:rPr lang="en-US" dirty="0">
-                <a:latin typeface="+mj-lt"/>
               </a:rPr>
-              <a:t>Primarily</a:t>
+              <a:t>See performance in markets in the next slide</a:t>
             </a:r>
           </a:p>
         </p:txBody>
@@ -24957,12 +27582,41 @@
           <a:chExt cx="0" cy="0"/>
         </a:xfrm>
       </p:grpSpPr>
+      <p:pic>
+        <p:nvPicPr>
+          <p:cNvPr id="7" name="Content Placeholder 6">
+            <a:extLst>
+              <a:ext uri="{FF2B5EF4-FFF2-40B4-BE49-F238E27FC236}">
+                <a16:creationId xmlns:a16="http://schemas.microsoft.com/office/drawing/2014/main" id="{78FCA0EB-26B4-749A-5326-5DCB48090AE1}"/>
+              </a:ext>
+            </a:extLst>
+          </p:cNvPr>
+          <p:cNvPicPr>
+            <a:picLocks noGrp="1" noChangeAspect="1"/>
+          </p:cNvPicPr>
+          <p:nvPr>
+            <p:ph idx="1"/>
+          </p:nvPr>
+        </p:nvPicPr>
+        <p:blipFill>
+          <a:blip r:embed="rId2"/>
+          <a:stretch>
+            <a:fillRect/>
+          </a:stretch>
+        </p:blipFill>
+        <p:spPr>
+          <a:xfrm>
+            <a:off x="4256135" y="1361457"/>
+            <a:ext cx="7496953" cy="5039343"/>
+          </a:xfrm>
+        </p:spPr>
+      </p:pic>
       <p:sp>
         <p:nvSpPr>
           <p:cNvPr id="2" name="Title 1">
             <a:extLst>
               <a:ext uri="{FF2B5EF4-FFF2-40B4-BE49-F238E27FC236}">
-                <a16:creationId xmlns:a16="http://schemas.microsoft.com/office/drawing/2014/main" id="{86B309B0-6209-D3D0-9D5E-308B9F6E7303}"/>
+                <a16:creationId xmlns:a16="http://schemas.microsoft.com/office/drawing/2014/main" id="{FE66EA1B-380B-B154-9CFC-9833A770D3F5}"/>
               </a:ext>
             </a:extLst>
           </p:cNvPr>
@@ -24975,32 +27629,31 @@
         </p:nvSpPr>
         <p:spPr>
           <a:xfrm>
-            <a:off x="2120348" y="941191"/>
-            <a:ext cx="10681252" cy="1070489"/>
+            <a:off x="438912" y="731520"/>
+            <a:ext cx="8609554" cy="1438474"/>
           </a:xfrm>
         </p:spPr>
         <p:txBody>
           <a:bodyPr/>
           <a:lstStyle/>
           <a:p>
-            <a:pPr algn="ctr"/>
-            <a:r>
-              <a:rPr lang="en-US" dirty="0"/>
-              <a:t>AREAS OF FOCUS</a:t>
-            </a:r>
-            <a:br>
-              <a:rPr lang="en-US" dirty="0"/>
-            </a:br>
-            <a:endParaRPr lang="en-US" dirty="0"/>
+            <a:r>
+              <a:rPr lang="en-US" dirty="0">
+                <a:solidFill>
+                  <a:srgbClr val="FF0000"/>
+                </a:solidFill>
+              </a:rPr>
+              <a:t>Cont.. Original films</a:t>
+            </a:r>
           </a:p>
         </p:txBody>
       </p:sp>
       <p:sp>
         <p:nvSpPr>
-          <p:cNvPr id="25" name="Slide Number Placeholder 24">
+          <p:cNvPr id="4" name="Slide Number Placeholder 3">
             <a:extLst>
               <a:ext uri="{FF2B5EF4-FFF2-40B4-BE49-F238E27FC236}">
-                <a16:creationId xmlns:a16="http://schemas.microsoft.com/office/drawing/2014/main" id="{5058AE03-D409-0714-CCED-4548A9C92023}"/>
+                <a16:creationId xmlns:a16="http://schemas.microsoft.com/office/drawing/2014/main" id="{161C914B-8453-9017-6BB4-6D65F12EA817}"/>
               </a:ext>
             </a:extLst>
           </p:cNvPr>
@@ -25026,96 +27679,132 @@
       </p:sp>
       <p:sp>
         <p:nvSpPr>
-          <p:cNvPr id="11" name="Text Placeholder 10">
+          <p:cNvPr id="8" name="TextBox 7">
             <a:extLst>
               <a:ext uri="{FF2B5EF4-FFF2-40B4-BE49-F238E27FC236}">
-                <a16:creationId xmlns:a16="http://schemas.microsoft.com/office/drawing/2014/main" id="{A2C39DD0-CD86-2929-7808-58D17FC2C0A6}"/>
+                <a16:creationId xmlns:a16="http://schemas.microsoft.com/office/drawing/2014/main" id="{08E164CE-EA60-56C9-534D-CC5DFD37B811}"/>
               </a:ext>
             </a:extLst>
           </p:cNvPr>
-          <p:cNvSpPr>
-            <a:spLocks noGrp="1"/>
-          </p:cNvSpPr>
-          <p:nvPr>
-            <p:ph type="body" idx="1"/>
-          </p:nvPr>
+          <p:cNvSpPr txBox="1"/>
+          <p:nvPr/>
         </p:nvSpPr>
         <p:spPr>
           <a:xfrm>
-            <a:off x="4465983" y="1877656"/>
-            <a:ext cx="6308034" cy="411480"/>
+            <a:off x="577369" y="1657472"/>
+            <a:ext cx="3720141" cy="4154984"/>
           </a:xfrm>
+          <a:prstGeom prst="rect">
+            <a:avLst/>
+          </a:prstGeom>
+          <a:noFill/>
         </p:spPr>
         <p:txBody>
-          <a:bodyPr/>
+          <a:bodyPr wrap="square" rtlCol="0">
+            <a:spAutoFit/>
+          </a:bodyPr>
           <a:lstStyle/>
           <a:p>
-            <a:pPr algn="ctr"/>
-            <a:r>
-              <a:rPr lang="en-US" dirty="0"/>
-              <a:t>Recommendation and  Areas of focus</a:t>
+            <a:r>
+              <a:rPr lang="en-US" sz="2400" b="1" dirty="0"/>
+              <a:t>INFERENCE:</a:t>
+            </a:r>
+          </a:p>
+          <a:p>
+            <a:endParaRPr lang="en-US" sz="2400" b="1" dirty="0"/>
+          </a:p>
+          <a:p>
+            <a:r>
+              <a:rPr lang="en-US" sz="2400" dirty="0">
+                <a:solidFill>
+                  <a:srgbClr val="0070C0"/>
+                </a:solidFill>
+              </a:rPr>
+              <a:t>It appeared that Old films did well in the worldwide market that new film production.</a:t>
+            </a:r>
+          </a:p>
+          <a:p>
+            <a:endParaRPr lang="en-US" sz="2400" dirty="0">
+              <a:solidFill>
+                <a:srgbClr val="0070C0"/>
+              </a:solidFill>
+            </a:endParaRPr>
+          </a:p>
+          <a:p>
+            <a:r>
+              <a:rPr lang="en-US" sz="2400" dirty="0">
+                <a:solidFill>
+                  <a:srgbClr val="0070C0"/>
+                </a:solidFill>
+              </a:rPr>
+              <a:t>This is clearly seen in </a:t>
+            </a:r>
+            <a:r>
+              <a:rPr lang="en-US" sz="2400" b="1" dirty="0"/>
+              <a:t>Figure 1.1</a:t>
+            </a:r>
+            <a:r>
+              <a:rPr lang="en-US" sz="2400" dirty="0">
+                <a:solidFill>
+                  <a:srgbClr val="0070C0"/>
+                </a:solidFill>
+              </a:rPr>
+              <a:t> with the </a:t>
+            </a:r>
+            <a:r>
+              <a:rPr lang="en-US" sz="2400" dirty="0"/>
+              <a:t>‘No’ </a:t>
+            </a:r>
+            <a:r>
+              <a:rPr lang="en-US" sz="2400" dirty="0">
+                <a:solidFill>
+                  <a:srgbClr val="0070C0"/>
+                </a:solidFill>
+              </a:rPr>
+              <a:t>category showing higher earnings globally.</a:t>
             </a:r>
           </a:p>
         </p:txBody>
       </p:sp>
       <p:sp>
         <p:nvSpPr>
-          <p:cNvPr id="12" name="Content Placeholder 11">
+          <p:cNvPr id="9" name="TextBox 8">
             <a:extLst>
               <a:ext uri="{FF2B5EF4-FFF2-40B4-BE49-F238E27FC236}">
-                <a16:creationId xmlns:a16="http://schemas.microsoft.com/office/drawing/2014/main" id="{CE3C1BFF-2275-1E7D-0604-E6F5CFEC01F6}"/>
+                <a16:creationId xmlns:a16="http://schemas.microsoft.com/office/drawing/2014/main" id="{17D807E6-CFA6-C846-735A-505C7324A5C4}"/>
               </a:ext>
             </a:extLst>
           </p:cNvPr>
-          <p:cNvSpPr>
-            <a:spLocks noGrp="1"/>
-          </p:cNvSpPr>
-          <p:nvPr>
-            <p:ph sz="half" idx="2"/>
-          </p:nvPr>
+          <p:cNvSpPr txBox="1"/>
+          <p:nvPr/>
         </p:nvSpPr>
         <p:spPr>
           <a:xfrm>
-            <a:off x="5500205" y="2726571"/>
-            <a:ext cx="3741928" cy="3684588"/>
+            <a:off x="9999373" y="5960567"/>
+            <a:ext cx="2551995" cy="369332"/>
           </a:xfrm>
+          <a:prstGeom prst="rect">
+            <a:avLst/>
+          </a:prstGeom>
+          <a:noFill/>
         </p:spPr>
         <p:txBody>
-          <a:bodyPr/>
+          <a:bodyPr wrap="square" rtlCol="0">
+            <a:spAutoFit/>
+          </a:bodyPr>
           <a:lstStyle/>
           <a:p>
             <a:r>
-              <a:rPr lang="en-US" sz="1800" dirty="0"/>
-              <a:t>Region: Set up a Studio in either: US, CA or in UK.</a:t>
-            </a:r>
-          </a:p>
-          <a:p>
-            <a:endParaRPr lang="en-US" sz="1800" dirty="0"/>
-          </a:p>
-          <a:p>
-            <a:r>
-              <a:rPr lang="en-US" sz="1800" dirty="0"/>
-              <a:t>Invest in the production of Action, Adventure or Sci-Fi Films.</a:t>
-            </a:r>
-          </a:p>
-          <a:p>
-            <a:endParaRPr lang="en-US" sz="1800" dirty="0"/>
-          </a:p>
-          <a:p>
-            <a:r>
-              <a:rPr lang="en-US" sz="1800" dirty="0"/>
-              <a:t>Leverage brand presence in mentioned regions to spur certain successful productions.</a:t>
-            </a:r>
-          </a:p>
-          <a:p>
-            <a:endParaRPr lang="en-US" sz="1800" dirty="0"/>
+              <a:rPr lang="en-US" b="1" dirty="0"/>
+              <a:t>Figure 1.1</a:t>
+            </a:r>
           </a:p>
         </p:txBody>
       </p:sp>
     </p:spTree>
     <p:extLst>
       <p:ext uri="{BB962C8B-B14F-4D97-AF65-F5344CB8AC3E}">
-        <p14:creationId xmlns:p14="http://schemas.microsoft.com/office/powerpoint/2010/main" val="3170280394"/>
+        <p14:creationId xmlns:p14="http://schemas.microsoft.com/office/powerpoint/2010/main" val="1717601063"/>
       </p:ext>
     </p:extLst>
   </p:cSld>
@@ -25622,15 +28311,6 @@
 </file>
 
 <file path=customXml/item1.xml><?xml version="1.0" encoding="utf-8"?>
-<?mso-contentType ?>
-<FormTemplates xmlns="http://schemas.microsoft.com/sharepoint/v3/contenttype/forms">
-  <Display>DocumentLibraryForm</Display>
-  <Edit>DocumentLibraryForm</Edit>
-  <New>DocumentLibraryForm</New>
-</FormTemplates>
-</file>
-
-<file path=customXml/item2.xml><?xml version="1.0" encoding="utf-8"?>
 <p:properties xmlns:p="http://schemas.microsoft.com/office/2006/metadata/properties" xmlns:xsi="http://www.w3.org/2001/XMLSchema-instance" xmlns:pc="http://schemas.microsoft.com/office/infopath/2007/PartnerControls">
   <documentManagement>
     <_ip_UnifiedCompliancePolicyUIAction xmlns="http://schemas.microsoft.com/sharepoint/v3" xsi:nil="true"/>
@@ -25648,6 +28328,15 @@
     <MediaServiceKeyPoints xmlns="71af3243-3dd4-4a8d-8c0d-dd76da1f02a5" xsi:nil="true"/>
   </documentManagement>
 </p:properties>
+</file>
+
+<file path=customXml/item2.xml><?xml version="1.0" encoding="utf-8"?>
+<?mso-contentType ?>
+<FormTemplates xmlns="http://schemas.microsoft.com/sharepoint/v3/contenttype/forms">
+  <Display>DocumentLibraryForm</Display>
+  <Edit>DocumentLibraryForm</Edit>
+  <New>DocumentLibraryForm</New>
+</FormTemplates>
 </file>
 
 <file path=customXml/item3.xml><?xml version="1.0" encoding="utf-8"?>
@@ -25963,14 +28652,6 @@
 </file>
 
 <file path=customXml/itemProps1.xml><?xml version="1.0" encoding="utf-8"?>
-<ds:datastoreItem xmlns:ds="http://schemas.openxmlformats.org/officeDocument/2006/customXml" ds:itemID="{69060146-7700-4F6C-986B-89E3839BD4ED}">
-  <ds:schemaRefs>
-    <ds:schemaRef ds:uri="http://schemas.microsoft.com/sharepoint/v3/contenttype/forms"/>
-  </ds:schemaRefs>
-</ds:datastoreItem>
-</file>
-
-<file path=customXml/itemProps2.xml><?xml version="1.0" encoding="utf-8"?>
 <ds:datastoreItem xmlns:ds="http://schemas.openxmlformats.org/officeDocument/2006/customXml" ds:itemID="{D235FEF8-1733-4347-95CE-3BB62B2B8DD7}">
   <ds:schemaRefs>
     <ds:schemaRef ds:uri="http://schemas.microsoft.com/office/2006/metadata/properties"/>
@@ -25978,6 +28659,14 @@
     <ds:schemaRef ds:uri="http://schemas.microsoft.com/sharepoint/v3"/>
     <ds:schemaRef ds:uri="71af3243-3dd4-4a8d-8c0d-dd76da1f02a5"/>
     <ds:schemaRef ds:uri="230e9df3-be65-4c73-a93b-d1236ebd677e"/>
+  </ds:schemaRefs>
+</ds:datastoreItem>
+</file>
+
+<file path=customXml/itemProps2.xml><?xml version="1.0" encoding="utf-8"?>
+<ds:datastoreItem xmlns:ds="http://schemas.openxmlformats.org/officeDocument/2006/customXml" ds:itemID="{69060146-7700-4F6C-986B-89E3839BD4ED}">
+  <ds:schemaRefs>
+    <ds:schemaRef ds:uri="http://schemas.microsoft.com/sharepoint/v3/contenttype/forms"/>
   </ds:schemaRefs>
 </ds:datastoreItem>
 </file>

</xml_diff>